<commit_message>
Entitätstypen nun im Plural
</commit_message>
<xml_diff>
--- a/pics/ERMs.pptx
+++ b/pics/ERMs.pptx
@@ -13,6 +13,7 @@
     <p:sldId id="262" r:id="rId7"/>
     <p:sldId id="263" r:id="rId8"/>
     <p:sldId id="264" r:id="rId9"/>
+    <p:sldId id="265" r:id="rId10"/>
   </p:sldIdLst>
   <p:sldSz cx="12192000" cy="6858000"/>
   <p:notesSz cx="6858000" cy="9144000"/>
@@ -133,6 +134,694 @@
 
 <file path=ppt/changesInfos/changesInfo1.xml><?xml version="1.0" encoding="utf-8"?>
 <pc:chgInfo xmlns:a="http://schemas.openxmlformats.org/drawingml/2006/main" xmlns:r="http://schemas.openxmlformats.org/officeDocument/2006/relationships" xmlns:ac="http://schemas.microsoft.com/office/drawing/2013/main/command" xmlns:pc="http://schemas.microsoft.com/office/powerpoint/2013/main/command">
+  <pc:docChgLst>
+    <pc:chgData name="Herrmann Maier" userId="daf89738-6842-4d38-a641-0f4c2c7a89f7" providerId="ADAL" clId="{52FF841C-F5DD-4FE6-B0EA-0F1F95B6D0F1}"/>
+    <pc:docChg chg="undo custSel addSld delSld modSld sldOrd">
+      <pc:chgData name="Herrmann Maier" userId="daf89738-6842-4d38-a641-0f4c2c7a89f7" providerId="ADAL" clId="{52FF841C-F5DD-4FE6-B0EA-0F1F95B6D0F1}" dt="2024-06-23T16:48:33.338" v="246" actId="14100"/>
+      <pc:docMkLst>
+        <pc:docMk/>
+      </pc:docMkLst>
+      <pc:sldChg chg="modSp mod">
+        <pc:chgData name="Herrmann Maier" userId="daf89738-6842-4d38-a641-0f4c2c7a89f7" providerId="ADAL" clId="{52FF841C-F5DD-4FE6-B0EA-0F1F95B6D0F1}" dt="2024-06-23T16:25:55.147" v="2" actId="20577"/>
+        <pc:sldMkLst>
+          <pc:docMk/>
+          <pc:sldMk cId="2511549162" sldId="256"/>
+        </pc:sldMkLst>
+        <pc:spChg chg="mod">
+          <ac:chgData name="Herrmann Maier" userId="daf89738-6842-4d38-a641-0f4c2c7a89f7" providerId="ADAL" clId="{52FF841C-F5DD-4FE6-B0EA-0F1F95B6D0F1}" dt="2024-06-23T16:25:55.147" v="2" actId="20577"/>
+          <ac:spMkLst>
+            <pc:docMk/>
+            <pc:sldMk cId="2511549162" sldId="256"/>
+            <ac:spMk id="5" creationId="{B9EA335E-E07E-EDA0-C5A5-31C0274AF129}"/>
+          </ac:spMkLst>
+        </pc:spChg>
+        <pc:spChg chg="mod">
+          <ac:chgData name="Herrmann Maier" userId="daf89738-6842-4d38-a641-0f4c2c7a89f7" providerId="ADAL" clId="{52FF841C-F5DD-4FE6-B0EA-0F1F95B6D0F1}" dt="2024-06-23T16:25:51.284" v="1" actId="20577"/>
+          <ac:spMkLst>
+            <pc:docMk/>
+            <pc:sldMk cId="2511549162" sldId="256"/>
+            <ac:spMk id="6" creationId="{BAE6EF1B-11DF-9923-A88B-DEA627AE6394}"/>
+          </ac:spMkLst>
+        </pc:spChg>
+      </pc:sldChg>
+      <pc:sldChg chg="modSp mod">
+        <pc:chgData name="Herrmann Maier" userId="daf89738-6842-4d38-a641-0f4c2c7a89f7" providerId="ADAL" clId="{52FF841C-F5DD-4FE6-B0EA-0F1F95B6D0F1}" dt="2024-06-23T16:26:07.019" v="7" actId="20577"/>
+        <pc:sldMkLst>
+          <pc:docMk/>
+          <pc:sldMk cId="2741195658" sldId="259"/>
+        </pc:sldMkLst>
+        <pc:spChg chg="mod">
+          <ac:chgData name="Herrmann Maier" userId="daf89738-6842-4d38-a641-0f4c2c7a89f7" providerId="ADAL" clId="{52FF841C-F5DD-4FE6-B0EA-0F1F95B6D0F1}" dt="2024-06-23T16:26:02.538" v="3" actId="20577"/>
+          <ac:spMkLst>
+            <pc:docMk/>
+            <pc:sldMk cId="2741195658" sldId="259"/>
+            <ac:spMk id="4" creationId="{95E38900-DA45-72A7-CFDA-4E67C7D8F66A}"/>
+          </ac:spMkLst>
+        </pc:spChg>
+        <pc:spChg chg="mod">
+          <ac:chgData name="Herrmann Maier" userId="daf89738-6842-4d38-a641-0f4c2c7a89f7" providerId="ADAL" clId="{52FF841C-F5DD-4FE6-B0EA-0F1F95B6D0F1}" dt="2024-06-23T16:26:07.019" v="7" actId="20577"/>
+          <ac:spMkLst>
+            <pc:docMk/>
+            <pc:sldMk cId="2741195658" sldId="259"/>
+            <ac:spMk id="5" creationId="{B9EA335E-E07E-EDA0-C5A5-31C0274AF129}"/>
+          </ac:spMkLst>
+        </pc:spChg>
+        <pc:spChg chg="mod">
+          <ac:chgData name="Herrmann Maier" userId="daf89738-6842-4d38-a641-0f4c2c7a89f7" providerId="ADAL" clId="{52FF841C-F5DD-4FE6-B0EA-0F1F95B6D0F1}" dt="2024-06-23T16:26:04.685" v="5" actId="20577"/>
+          <ac:spMkLst>
+            <pc:docMk/>
+            <pc:sldMk cId="2741195658" sldId="259"/>
+            <ac:spMk id="62" creationId="{3ACFC530-4D7B-A4CD-F944-807C1A1420E3}"/>
+          </ac:spMkLst>
+        </pc:spChg>
+      </pc:sldChg>
+      <pc:sldChg chg="modSp mod">
+        <pc:chgData name="Herrmann Maier" userId="daf89738-6842-4d38-a641-0f4c2c7a89f7" providerId="ADAL" clId="{52FF841C-F5DD-4FE6-B0EA-0F1F95B6D0F1}" dt="2024-06-23T16:26:50.057" v="34" actId="20577"/>
+        <pc:sldMkLst>
+          <pc:docMk/>
+          <pc:sldMk cId="2538948217" sldId="260"/>
+        </pc:sldMkLst>
+        <pc:spChg chg="mod">
+          <ac:chgData name="Herrmann Maier" userId="daf89738-6842-4d38-a641-0f4c2c7a89f7" providerId="ADAL" clId="{52FF841C-F5DD-4FE6-B0EA-0F1F95B6D0F1}" dt="2024-06-23T16:26:41.588" v="28" actId="14100"/>
+          <ac:spMkLst>
+            <pc:docMk/>
+            <pc:sldMk cId="2538948217" sldId="260"/>
+            <ac:spMk id="2" creationId="{FC9D4B7C-5784-1F4B-F073-0F43D9DAF279}"/>
+          </ac:spMkLst>
+        </pc:spChg>
+        <pc:spChg chg="mod">
+          <ac:chgData name="Herrmann Maier" userId="daf89738-6842-4d38-a641-0f4c2c7a89f7" providerId="ADAL" clId="{52FF841C-F5DD-4FE6-B0EA-0F1F95B6D0F1}" dt="2024-06-23T16:26:16.637" v="17" actId="20577"/>
+          <ac:spMkLst>
+            <pc:docMk/>
+            <pc:sldMk cId="2538948217" sldId="260"/>
+            <ac:spMk id="4" creationId="{D0E8120F-626E-CAB7-16F4-50F853817B03}"/>
+          </ac:spMkLst>
+        </pc:spChg>
+        <pc:spChg chg="mod">
+          <ac:chgData name="Herrmann Maier" userId="daf89738-6842-4d38-a641-0f4c2c7a89f7" providerId="ADAL" clId="{52FF841C-F5DD-4FE6-B0EA-0F1F95B6D0F1}" dt="2024-06-23T16:26:19.094" v="19" actId="20577"/>
+          <ac:spMkLst>
+            <pc:docMk/>
+            <pc:sldMk cId="2538948217" sldId="260"/>
+            <ac:spMk id="14" creationId="{6590A6A4-DEF1-73C7-A281-0205863416FF}"/>
+          </ac:spMkLst>
+        </pc:spChg>
+        <pc:spChg chg="mod">
+          <ac:chgData name="Herrmann Maier" userId="daf89738-6842-4d38-a641-0f4c2c7a89f7" providerId="ADAL" clId="{52FF841C-F5DD-4FE6-B0EA-0F1F95B6D0F1}" dt="2024-06-23T16:26:45.911" v="31" actId="20577"/>
+          <ac:spMkLst>
+            <pc:docMk/>
+            <pc:sldMk cId="2538948217" sldId="260"/>
+            <ac:spMk id="16" creationId="{EACEED51-317A-5E4F-8D97-F7AF403C4BBC}"/>
+          </ac:spMkLst>
+        </pc:spChg>
+        <pc:spChg chg="mod">
+          <ac:chgData name="Herrmann Maier" userId="daf89738-6842-4d38-a641-0f4c2c7a89f7" providerId="ADAL" clId="{52FF841C-F5DD-4FE6-B0EA-0F1F95B6D0F1}" dt="2024-06-23T16:26:21.647" v="21" actId="20577"/>
+          <ac:spMkLst>
+            <pc:docMk/>
+            <pc:sldMk cId="2538948217" sldId="260"/>
+            <ac:spMk id="21" creationId="{C4764C91-16DD-2D1D-07B5-EBA3F555529B}"/>
+          </ac:spMkLst>
+        </pc:spChg>
+        <pc:spChg chg="mod">
+          <ac:chgData name="Herrmann Maier" userId="daf89738-6842-4d38-a641-0f4c2c7a89f7" providerId="ADAL" clId="{52FF841C-F5DD-4FE6-B0EA-0F1F95B6D0F1}" dt="2024-06-23T16:26:50.057" v="34" actId="20577"/>
+          <ac:spMkLst>
+            <pc:docMk/>
+            <pc:sldMk cId="2538948217" sldId="260"/>
+            <ac:spMk id="23" creationId="{9F790685-2F12-A2C3-AC9D-9D3557008411}"/>
+          </ac:spMkLst>
+        </pc:spChg>
+        <pc:cxnChg chg="mod">
+          <ac:chgData name="Herrmann Maier" userId="daf89738-6842-4d38-a641-0f4c2c7a89f7" providerId="ADAL" clId="{52FF841C-F5DD-4FE6-B0EA-0F1F95B6D0F1}" dt="2024-06-23T16:26:41.588" v="28" actId="14100"/>
+          <ac:cxnSpMkLst>
+            <pc:docMk/>
+            <pc:sldMk cId="2538948217" sldId="260"/>
+            <ac:cxnSpMk id="9" creationId="{53245807-658C-11B0-90B2-DA481125E3E8}"/>
+          </ac:cxnSpMkLst>
+        </pc:cxnChg>
+      </pc:sldChg>
+      <pc:sldChg chg="modSp mod">
+        <pc:chgData name="Herrmann Maier" userId="daf89738-6842-4d38-a641-0f4c2c7a89f7" providerId="ADAL" clId="{52FF841C-F5DD-4FE6-B0EA-0F1F95B6D0F1}" dt="2024-06-23T16:27:02.881" v="46" actId="20577"/>
+        <pc:sldMkLst>
+          <pc:docMk/>
+          <pc:sldMk cId="2569547350" sldId="261"/>
+        </pc:sldMkLst>
+        <pc:spChg chg="mod">
+          <ac:chgData name="Herrmann Maier" userId="daf89738-6842-4d38-a641-0f4c2c7a89f7" providerId="ADAL" clId="{52FF841C-F5DD-4FE6-B0EA-0F1F95B6D0F1}" dt="2024-06-23T16:26:53.768" v="35" actId="20577"/>
+          <ac:spMkLst>
+            <pc:docMk/>
+            <pc:sldMk cId="2569547350" sldId="261"/>
+            <ac:spMk id="4" creationId="{95E38900-DA45-72A7-CFDA-4E67C7D8F66A}"/>
+          </ac:spMkLst>
+        </pc:spChg>
+        <pc:spChg chg="mod">
+          <ac:chgData name="Herrmann Maier" userId="daf89738-6842-4d38-a641-0f4c2c7a89f7" providerId="ADAL" clId="{52FF841C-F5DD-4FE6-B0EA-0F1F95B6D0F1}" dt="2024-06-23T16:27:00.108" v="45" actId="20577"/>
+          <ac:spMkLst>
+            <pc:docMk/>
+            <pc:sldMk cId="2569547350" sldId="261"/>
+            <ac:spMk id="5" creationId="{B9EA335E-E07E-EDA0-C5A5-31C0274AF129}"/>
+          </ac:spMkLst>
+        </pc:spChg>
+        <pc:spChg chg="mod">
+          <ac:chgData name="Herrmann Maier" userId="daf89738-6842-4d38-a641-0f4c2c7a89f7" providerId="ADAL" clId="{52FF841C-F5DD-4FE6-B0EA-0F1F95B6D0F1}" dt="2024-06-23T16:26:55.401" v="36" actId="20577"/>
+          <ac:spMkLst>
+            <pc:docMk/>
+            <pc:sldMk cId="2569547350" sldId="261"/>
+            <ac:spMk id="27" creationId="{749CF023-5DF9-C153-266D-3A7B5780B73A}"/>
+          </ac:spMkLst>
+        </pc:spChg>
+        <pc:spChg chg="mod">
+          <ac:chgData name="Herrmann Maier" userId="daf89738-6842-4d38-a641-0f4c2c7a89f7" providerId="ADAL" clId="{52FF841C-F5DD-4FE6-B0EA-0F1F95B6D0F1}" dt="2024-06-23T16:27:02.881" v="46" actId="20577"/>
+          <ac:spMkLst>
+            <pc:docMk/>
+            <pc:sldMk cId="2569547350" sldId="261"/>
+            <ac:spMk id="28" creationId="{38D99A9C-E304-5853-F7AE-1ECC9737C9A1}"/>
+          </ac:spMkLst>
+        </pc:spChg>
+      </pc:sldChg>
+      <pc:sldChg chg="modSp mod">
+        <pc:chgData name="Herrmann Maier" userId="daf89738-6842-4d38-a641-0f4c2c7a89f7" providerId="ADAL" clId="{52FF841C-F5DD-4FE6-B0EA-0F1F95B6D0F1}" dt="2024-06-23T16:27:14.783" v="52" actId="20577"/>
+        <pc:sldMkLst>
+          <pc:docMk/>
+          <pc:sldMk cId="3209596297" sldId="262"/>
+        </pc:sldMkLst>
+        <pc:spChg chg="mod">
+          <ac:chgData name="Herrmann Maier" userId="daf89738-6842-4d38-a641-0f4c2c7a89f7" providerId="ADAL" clId="{52FF841C-F5DD-4FE6-B0EA-0F1F95B6D0F1}" dt="2024-06-23T16:27:07.500" v="47" actId="20577"/>
+          <ac:spMkLst>
+            <pc:docMk/>
+            <pc:sldMk cId="3209596297" sldId="262"/>
+            <ac:spMk id="4" creationId="{95E38900-DA45-72A7-CFDA-4E67C7D8F66A}"/>
+          </ac:spMkLst>
+        </pc:spChg>
+        <pc:spChg chg="mod">
+          <ac:chgData name="Herrmann Maier" userId="daf89738-6842-4d38-a641-0f4c2c7a89f7" providerId="ADAL" clId="{52FF841C-F5DD-4FE6-B0EA-0F1F95B6D0F1}" dt="2024-06-23T16:27:11.894" v="51" actId="20577"/>
+          <ac:spMkLst>
+            <pc:docMk/>
+            <pc:sldMk cId="3209596297" sldId="262"/>
+            <ac:spMk id="5" creationId="{B9EA335E-E07E-EDA0-C5A5-31C0274AF129}"/>
+          </ac:spMkLst>
+        </pc:spChg>
+        <pc:spChg chg="mod">
+          <ac:chgData name="Herrmann Maier" userId="daf89738-6842-4d38-a641-0f4c2c7a89f7" providerId="ADAL" clId="{52FF841C-F5DD-4FE6-B0EA-0F1F95B6D0F1}" dt="2024-06-23T16:27:14.783" v="52" actId="20577"/>
+          <ac:spMkLst>
+            <pc:docMk/>
+            <pc:sldMk cId="3209596297" sldId="262"/>
+            <ac:spMk id="23" creationId="{AEE3D1BC-F6FC-C099-7896-9DFF42B6DF37}"/>
+          </ac:spMkLst>
+        </pc:spChg>
+      </pc:sldChg>
+      <pc:sldChg chg="modSp mod">
+        <pc:chgData name="Herrmann Maier" userId="daf89738-6842-4d38-a641-0f4c2c7a89f7" providerId="ADAL" clId="{52FF841C-F5DD-4FE6-B0EA-0F1F95B6D0F1}" dt="2024-06-23T16:27:19.475" v="53" actId="20577"/>
+        <pc:sldMkLst>
+          <pc:docMk/>
+          <pc:sldMk cId="2640427441" sldId="263"/>
+        </pc:sldMkLst>
+        <pc:spChg chg="mod">
+          <ac:chgData name="Herrmann Maier" userId="daf89738-6842-4d38-a641-0f4c2c7a89f7" providerId="ADAL" clId="{52FF841C-F5DD-4FE6-B0EA-0F1F95B6D0F1}" dt="2024-06-23T16:27:19.475" v="53" actId="20577"/>
+          <ac:spMkLst>
+            <pc:docMk/>
+            <pc:sldMk cId="2640427441" sldId="263"/>
+            <ac:spMk id="43" creationId="{E34A3DAB-40E9-060C-A597-A23A6E5298A2}"/>
+          </ac:spMkLst>
+        </pc:spChg>
+      </pc:sldChg>
+      <pc:sldChg chg="modSp mod">
+        <pc:chgData name="Herrmann Maier" userId="daf89738-6842-4d38-a641-0f4c2c7a89f7" providerId="ADAL" clId="{52FF841C-F5DD-4FE6-B0EA-0F1F95B6D0F1}" dt="2024-06-23T16:27:24.192" v="54" actId="20577"/>
+        <pc:sldMkLst>
+          <pc:docMk/>
+          <pc:sldMk cId="891319327" sldId="264"/>
+        </pc:sldMkLst>
+        <pc:spChg chg="mod">
+          <ac:chgData name="Herrmann Maier" userId="daf89738-6842-4d38-a641-0f4c2c7a89f7" providerId="ADAL" clId="{52FF841C-F5DD-4FE6-B0EA-0F1F95B6D0F1}" dt="2024-06-23T16:27:24.192" v="54" actId="20577"/>
+          <ac:spMkLst>
+            <pc:docMk/>
+            <pc:sldMk cId="891319327" sldId="264"/>
+            <ac:spMk id="5" creationId="{B9EA335E-E07E-EDA0-C5A5-31C0274AF129}"/>
+          </ac:spMkLst>
+        </pc:spChg>
+      </pc:sldChg>
+      <pc:sldChg chg="modSp add del mod">
+        <pc:chgData name="Herrmann Maier" userId="daf89738-6842-4d38-a641-0f4c2c7a89f7" providerId="ADAL" clId="{52FF841C-F5DD-4FE6-B0EA-0F1F95B6D0F1}" dt="2024-06-23T16:45:10.182" v="61" actId="2696"/>
+        <pc:sldMkLst>
+          <pc:docMk/>
+          <pc:sldMk cId="687033237" sldId="265"/>
+        </pc:sldMkLst>
+        <pc:spChg chg="mod">
+          <ac:chgData name="Herrmann Maier" userId="daf89738-6842-4d38-a641-0f4c2c7a89f7" providerId="ADAL" clId="{52FF841C-F5DD-4FE6-B0EA-0F1F95B6D0F1}" dt="2024-06-23T16:44:53.173" v="58" actId="1076"/>
+          <ac:spMkLst>
+            <pc:docMk/>
+            <pc:sldMk cId="687033237" sldId="265"/>
+            <ac:spMk id="4" creationId="{95E38900-DA45-72A7-CFDA-4E67C7D8F66A}"/>
+          </ac:spMkLst>
+        </pc:spChg>
+        <pc:spChg chg="mod">
+          <ac:chgData name="Herrmann Maier" userId="daf89738-6842-4d38-a641-0f4c2c7a89f7" providerId="ADAL" clId="{52FF841C-F5DD-4FE6-B0EA-0F1F95B6D0F1}" dt="2024-06-23T16:45:02.408" v="60" actId="1076"/>
+          <ac:spMkLst>
+            <pc:docMk/>
+            <pc:sldMk cId="687033237" sldId="265"/>
+            <ac:spMk id="5" creationId="{B9EA335E-E07E-EDA0-C5A5-31C0274AF129}"/>
+          </ac:spMkLst>
+        </pc:spChg>
+        <pc:spChg chg="mod">
+          <ac:chgData name="Herrmann Maier" userId="daf89738-6842-4d38-a641-0f4c2c7a89f7" providerId="ADAL" clId="{52FF841C-F5DD-4FE6-B0EA-0F1F95B6D0F1}" dt="2024-06-23T16:44:50.888" v="57" actId="1076"/>
+          <ac:spMkLst>
+            <pc:docMk/>
+            <pc:sldMk cId="687033237" sldId="265"/>
+            <ac:spMk id="70" creationId="{90BB53B5-281F-4840-D640-26148DEAA191}"/>
+          </ac:spMkLst>
+        </pc:spChg>
+        <pc:spChg chg="mod">
+          <ac:chgData name="Herrmann Maier" userId="daf89738-6842-4d38-a641-0f4c2c7a89f7" providerId="ADAL" clId="{52FF841C-F5DD-4FE6-B0EA-0F1F95B6D0F1}" dt="2024-06-23T16:44:59.853" v="59" actId="1076"/>
+          <ac:spMkLst>
+            <pc:docMk/>
+            <pc:sldMk cId="687033237" sldId="265"/>
+            <ac:spMk id="71" creationId="{A3E966E6-46DE-DE87-7316-396A854EE56C}"/>
+          </ac:spMkLst>
+        </pc:spChg>
+        <pc:cxnChg chg="mod">
+          <ac:chgData name="Herrmann Maier" userId="daf89738-6842-4d38-a641-0f4c2c7a89f7" providerId="ADAL" clId="{52FF841C-F5DD-4FE6-B0EA-0F1F95B6D0F1}" dt="2024-06-23T16:44:53.173" v="58" actId="1076"/>
+          <ac:cxnSpMkLst>
+            <pc:docMk/>
+            <pc:sldMk cId="687033237" sldId="265"/>
+            <ac:cxnSpMk id="34" creationId="{C2493FA6-F12A-BF20-A633-F5B0767907EC}"/>
+          </ac:cxnSpMkLst>
+        </pc:cxnChg>
+        <pc:cxnChg chg="mod">
+          <ac:chgData name="Herrmann Maier" userId="daf89738-6842-4d38-a641-0f4c2c7a89f7" providerId="ADAL" clId="{52FF841C-F5DD-4FE6-B0EA-0F1F95B6D0F1}" dt="2024-06-23T16:44:53.173" v="58" actId="1076"/>
+          <ac:cxnSpMkLst>
+            <pc:docMk/>
+            <pc:sldMk cId="687033237" sldId="265"/>
+            <ac:cxnSpMk id="37" creationId="{57C9A4A8-20F2-C169-8790-055CE7C3E777}"/>
+          </ac:cxnSpMkLst>
+        </pc:cxnChg>
+        <pc:cxnChg chg="mod">
+          <ac:chgData name="Herrmann Maier" userId="daf89738-6842-4d38-a641-0f4c2c7a89f7" providerId="ADAL" clId="{52FF841C-F5DD-4FE6-B0EA-0F1F95B6D0F1}" dt="2024-06-23T16:44:53.173" v="58" actId="1076"/>
+          <ac:cxnSpMkLst>
+            <pc:docMk/>
+            <pc:sldMk cId="687033237" sldId="265"/>
+            <ac:cxnSpMk id="46" creationId="{C470D6A2-1059-05EA-C1C2-6962EBC1C45B}"/>
+          </ac:cxnSpMkLst>
+        </pc:cxnChg>
+        <pc:cxnChg chg="mod">
+          <ac:chgData name="Herrmann Maier" userId="daf89738-6842-4d38-a641-0f4c2c7a89f7" providerId="ADAL" clId="{52FF841C-F5DD-4FE6-B0EA-0F1F95B6D0F1}" dt="2024-06-23T16:45:02.408" v="60" actId="1076"/>
+          <ac:cxnSpMkLst>
+            <pc:docMk/>
+            <pc:sldMk cId="687033237" sldId="265"/>
+            <ac:cxnSpMk id="61" creationId="{DAE6E77C-D0D8-C553-C8CC-6468364995DE}"/>
+          </ac:cxnSpMkLst>
+        </pc:cxnChg>
+        <pc:cxnChg chg="mod">
+          <ac:chgData name="Herrmann Maier" userId="daf89738-6842-4d38-a641-0f4c2c7a89f7" providerId="ADAL" clId="{52FF841C-F5DD-4FE6-B0EA-0F1F95B6D0F1}" dt="2024-06-23T16:45:02.408" v="60" actId="1076"/>
+          <ac:cxnSpMkLst>
+            <pc:docMk/>
+            <pc:sldMk cId="687033237" sldId="265"/>
+            <ac:cxnSpMk id="64" creationId="{18B75207-C555-E5B1-AE3F-878404DEC5D8}"/>
+          </ac:cxnSpMkLst>
+        </pc:cxnChg>
+        <pc:cxnChg chg="mod">
+          <ac:chgData name="Herrmann Maier" userId="daf89738-6842-4d38-a641-0f4c2c7a89f7" providerId="ADAL" clId="{52FF841C-F5DD-4FE6-B0EA-0F1F95B6D0F1}" dt="2024-06-23T16:44:53.173" v="58" actId="1076"/>
+          <ac:cxnSpMkLst>
+            <pc:docMk/>
+            <pc:sldMk cId="687033237" sldId="265"/>
+            <ac:cxnSpMk id="74" creationId="{93BB192E-A248-5C28-D1BA-68043BEECC3E}"/>
+          </ac:cxnSpMkLst>
+        </pc:cxnChg>
+        <pc:cxnChg chg="mod">
+          <ac:chgData name="Herrmann Maier" userId="daf89738-6842-4d38-a641-0f4c2c7a89f7" providerId="ADAL" clId="{52FF841C-F5DD-4FE6-B0EA-0F1F95B6D0F1}" dt="2024-06-23T16:45:02.408" v="60" actId="1076"/>
+          <ac:cxnSpMkLst>
+            <pc:docMk/>
+            <pc:sldMk cId="687033237" sldId="265"/>
+            <ac:cxnSpMk id="77" creationId="{70D6F89D-EF7D-6C8B-B472-11616787E1B4}"/>
+          </ac:cxnSpMkLst>
+        </pc:cxnChg>
+        <pc:cxnChg chg="mod">
+          <ac:chgData name="Herrmann Maier" userId="daf89738-6842-4d38-a641-0f4c2c7a89f7" providerId="ADAL" clId="{52FF841C-F5DD-4FE6-B0EA-0F1F95B6D0F1}" dt="2024-06-23T16:45:02.408" v="60" actId="1076"/>
+          <ac:cxnSpMkLst>
+            <pc:docMk/>
+            <pc:sldMk cId="687033237" sldId="265"/>
+            <ac:cxnSpMk id="100" creationId="{E771EF03-BE51-C3EC-FAAB-5D7CCB20615D}"/>
+          </ac:cxnSpMkLst>
+        </pc:cxnChg>
+        <pc:cxnChg chg="mod">
+          <ac:chgData name="Herrmann Maier" userId="daf89738-6842-4d38-a641-0f4c2c7a89f7" providerId="ADAL" clId="{52FF841C-F5DD-4FE6-B0EA-0F1F95B6D0F1}" dt="2024-06-23T16:44:59.853" v="59" actId="1076"/>
+          <ac:cxnSpMkLst>
+            <pc:docMk/>
+            <pc:sldMk cId="687033237" sldId="265"/>
+            <ac:cxnSpMk id="104" creationId="{0305B770-270C-9515-FB7B-18B3A1C7886A}"/>
+          </ac:cxnSpMkLst>
+        </pc:cxnChg>
+      </pc:sldChg>
+      <pc:sldChg chg="delSp modSp add mod ord">
+        <pc:chgData name="Herrmann Maier" userId="daf89738-6842-4d38-a641-0f4c2c7a89f7" providerId="ADAL" clId="{52FF841C-F5DD-4FE6-B0EA-0F1F95B6D0F1}" dt="2024-06-23T16:48:33.338" v="246" actId="14100"/>
+        <pc:sldMkLst>
+          <pc:docMk/>
+          <pc:sldMk cId="2825963552" sldId="265"/>
+        </pc:sldMkLst>
+        <pc:spChg chg="mod">
+          <ac:chgData name="Herrmann Maier" userId="daf89738-6842-4d38-a641-0f4c2c7a89f7" providerId="ADAL" clId="{52FF841C-F5DD-4FE6-B0EA-0F1F95B6D0F1}" dt="2024-06-23T16:45:39.392" v="94" actId="20577"/>
+          <ac:spMkLst>
+            <pc:docMk/>
+            <pc:sldMk cId="2825963552" sldId="265"/>
+            <ac:spMk id="4" creationId="{D0E8120F-626E-CAB7-16F4-50F853817B03}"/>
+          </ac:spMkLst>
+        </pc:spChg>
+        <pc:spChg chg="mod">
+          <ac:chgData name="Herrmann Maier" userId="daf89738-6842-4d38-a641-0f4c2c7a89f7" providerId="ADAL" clId="{52FF841C-F5DD-4FE6-B0EA-0F1F95B6D0F1}" dt="2024-06-23T16:46:28.744" v="140" actId="20577"/>
+          <ac:spMkLst>
+            <pc:docMk/>
+            <pc:sldMk cId="2825963552" sldId="265"/>
+            <ac:spMk id="5" creationId="{B9A24DD7-C17B-B463-1362-0CF1D5876416}"/>
+          </ac:spMkLst>
+        </pc:spChg>
+        <pc:spChg chg="del">
+          <ac:chgData name="Herrmann Maier" userId="daf89738-6842-4d38-a641-0f4c2c7a89f7" providerId="ADAL" clId="{52FF841C-F5DD-4FE6-B0EA-0F1F95B6D0F1}" dt="2024-06-23T16:46:01.555" v="120" actId="478"/>
+          <ac:spMkLst>
+            <pc:docMk/>
+            <pc:sldMk cId="2825963552" sldId="265"/>
+            <ac:spMk id="10" creationId="{9FE65DAA-F1B5-552F-9813-AF5700759521}"/>
+          </ac:spMkLst>
+        </pc:spChg>
+        <pc:spChg chg="mod">
+          <ac:chgData name="Herrmann Maier" userId="daf89738-6842-4d38-a641-0f4c2c7a89f7" providerId="ADAL" clId="{52FF841C-F5DD-4FE6-B0EA-0F1F95B6D0F1}" dt="2024-06-23T16:46:16.138" v="128" actId="1076"/>
+          <ac:spMkLst>
+            <pc:docMk/>
+            <pc:sldMk cId="2825963552" sldId="265"/>
+            <ac:spMk id="12" creationId="{D2DFCF98-0141-93BA-3C87-96DEBFA819AB}"/>
+          </ac:spMkLst>
+        </pc:spChg>
+        <pc:spChg chg="del">
+          <ac:chgData name="Herrmann Maier" userId="daf89738-6842-4d38-a641-0f4c2c7a89f7" providerId="ADAL" clId="{52FF841C-F5DD-4FE6-B0EA-0F1F95B6D0F1}" dt="2024-06-23T16:46:05.992" v="125" actId="478"/>
+          <ac:spMkLst>
+            <pc:docMk/>
+            <pc:sldMk cId="2825963552" sldId="265"/>
+            <ac:spMk id="13" creationId="{46176577-2E4E-A1B1-2458-A7454FDA33FA}"/>
+          </ac:spMkLst>
+        </pc:spChg>
+        <pc:spChg chg="del">
+          <ac:chgData name="Herrmann Maier" userId="daf89738-6842-4d38-a641-0f4c2c7a89f7" providerId="ADAL" clId="{52FF841C-F5DD-4FE6-B0EA-0F1F95B6D0F1}" dt="2024-06-23T16:46:05.992" v="125" actId="478"/>
+          <ac:spMkLst>
+            <pc:docMk/>
+            <pc:sldMk cId="2825963552" sldId="265"/>
+            <ac:spMk id="14" creationId="{0B93FBAF-D273-56A6-A6E0-F174F66FD26B}"/>
+          </ac:spMkLst>
+        </pc:spChg>
+        <pc:spChg chg="del">
+          <ac:chgData name="Herrmann Maier" userId="daf89738-6842-4d38-a641-0f4c2c7a89f7" providerId="ADAL" clId="{52FF841C-F5DD-4FE6-B0EA-0F1F95B6D0F1}" dt="2024-06-23T16:45:59.124" v="119" actId="478"/>
+          <ac:spMkLst>
+            <pc:docMk/>
+            <pc:sldMk cId="2825963552" sldId="265"/>
+            <ac:spMk id="15" creationId="{93B6F22D-9ACA-8711-CB48-035AE05ECD6B}"/>
+          </ac:spMkLst>
+        </pc:spChg>
+        <pc:spChg chg="mod">
+          <ac:chgData name="Herrmann Maier" userId="daf89738-6842-4d38-a641-0f4c2c7a89f7" providerId="ADAL" clId="{52FF841C-F5DD-4FE6-B0EA-0F1F95B6D0F1}" dt="2024-06-23T16:46:09.480" v="127" actId="14100"/>
+          <ac:spMkLst>
+            <pc:docMk/>
+            <pc:sldMk cId="2825963552" sldId="265"/>
+            <ac:spMk id="16" creationId="{DE5C2875-BCE3-A716-30D6-06430593A61F}"/>
+          </ac:spMkLst>
+        </pc:spChg>
+        <pc:spChg chg="del mod">
+          <ac:chgData name="Herrmann Maier" userId="daf89738-6842-4d38-a641-0f4c2c7a89f7" providerId="ADAL" clId="{52FF841C-F5DD-4FE6-B0EA-0F1F95B6D0F1}" dt="2024-06-23T16:45:55.578" v="116" actId="478"/>
+          <ac:spMkLst>
+            <pc:docMk/>
+            <pc:sldMk cId="2825963552" sldId="265"/>
+            <ac:spMk id="17" creationId="{3C201E23-1B5C-7B0E-D05C-F691DCE60CD8}"/>
+          </ac:spMkLst>
+        </pc:spChg>
+        <pc:spChg chg="del">
+          <ac:chgData name="Herrmann Maier" userId="daf89738-6842-4d38-a641-0f4c2c7a89f7" providerId="ADAL" clId="{52FF841C-F5DD-4FE6-B0EA-0F1F95B6D0F1}" dt="2024-06-23T16:45:59.124" v="119" actId="478"/>
+          <ac:spMkLst>
+            <pc:docMk/>
+            <pc:sldMk cId="2825963552" sldId="265"/>
+            <ac:spMk id="18" creationId="{45253303-2BDD-8DF0-E010-7EDE376024F9}"/>
+          </ac:spMkLst>
+        </pc:spChg>
+        <pc:spChg chg="mod">
+          <ac:chgData name="Herrmann Maier" userId="daf89738-6842-4d38-a641-0f4c2c7a89f7" providerId="ADAL" clId="{52FF841C-F5DD-4FE6-B0EA-0F1F95B6D0F1}" dt="2024-06-23T16:45:27.433" v="70" actId="20577"/>
+          <ac:spMkLst>
+            <pc:docMk/>
+            <pc:sldMk cId="2825963552" sldId="265"/>
+            <ac:spMk id="43" creationId="{E34A3DAB-40E9-060C-A597-A23A6E5298A2}"/>
+          </ac:spMkLst>
+        </pc:spChg>
+        <pc:spChg chg="mod">
+          <ac:chgData name="Herrmann Maier" userId="daf89738-6842-4d38-a641-0f4c2c7a89f7" providerId="ADAL" clId="{52FF841C-F5DD-4FE6-B0EA-0F1F95B6D0F1}" dt="2024-06-23T16:46:51.610" v="159" actId="20577"/>
+          <ac:spMkLst>
+            <pc:docMk/>
+            <pc:sldMk cId="2825963552" sldId="265"/>
+            <ac:spMk id="53" creationId="{592FC410-3A64-0BFF-1DAF-15E609F05257}"/>
+          </ac:spMkLst>
+        </pc:spChg>
+        <pc:spChg chg="mod">
+          <ac:chgData name="Herrmann Maier" userId="daf89738-6842-4d38-a641-0f4c2c7a89f7" providerId="ADAL" clId="{52FF841C-F5DD-4FE6-B0EA-0F1F95B6D0F1}" dt="2024-06-23T16:46:57.038" v="166" actId="20577"/>
+          <ac:spMkLst>
+            <pc:docMk/>
+            <pc:sldMk cId="2825963552" sldId="265"/>
+            <ac:spMk id="54" creationId="{43E65022-3079-C656-FADE-5FD859A7F58F}"/>
+          </ac:spMkLst>
+        </pc:spChg>
+        <pc:spChg chg="mod">
+          <ac:chgData name="Herrmann Maier" userId="daf89738-6842-4d38-a641-0f4c2c7a89f7" providerId="ADAL" clId="{52FF841C-F5DD-4FE6-B0EA-0F1F95B6D0F1}" dt="2024-06-23T16:47:01.284" v="174" actId="20577"/>
+          <ac:spMkLst>
+            <pc:docMk/>
+            <pc:sldMk cId="2825963552" sldId="265"/>
+            <ac:spMk id="55" creationId="{48070636-8A11-0257-1F6C-7F47CF5612A4}"/>
+          </ac:spMkLst>
+        </pc:spChg>
+        <pc:spChg chg="mod">
+          <ac:chgData name="Herrmann Maier" userId="daf89738-6842-4d38-a641-0f4c2c7a89f7" providerId="ADAL" clId="{52FF841C-F5DD-4FE6-B0EA-0F1F95B6D0F1}" dt="2024-06-23T16:47:14.290" v="194" actId="14100"/>
+          <ac:spMkLst>
+            <pc:docMk/>
+            <pc:sldMk cId="2825963552" sldId="265"/>
+            <ac:spMk id="57" creationId="{B9B7A791-5C95-F675-58D7-F4E7E5176977}"/>
+          </ac:spMkLst>
+        </pc:spChg>
+        <pc:spChg chg="mod">
+          <ac:chgData name="Herrmann Maier" userId="daf89738-6842-4d38-a641-0f4c2c7a89f7" providerId="ADAL" clId="{52FF841C-F5DD-4FE6-B0EA-0F1F95B6D0F1}" dt="2024-06-23T16:45:32.225" v="78" actId="20577"/>
+          <ac:spMkLst>
+            <pc:docMk/>
+            <pc:sldMk cId="2825963552" sldId="265"/>
+            <ac:spMk id="58" creationId="{D487A4CE-3B99-B08C-33B7-1C9D2E5EA6CE}"/>
+          </ac:spMkLst>
+        </pc:spChg>
+        <pc:spChg chg="mod">
+          <ac:chgData name="Herrmann Maier" userId="daf89738-6842-4d38-a641-0f4c2c7a89f7" providerId="ADAL" clId="{52FF841C-F5DD-4FE6-B0EA-0F1F95B6D0F1}" dt="2024-06-23T16:48:31.445" v="245" actId="1076"/>
+          <ac:spMkLst>
+            <pc:docMk/>
+            <pc:sldMk cId="2825963552" sldId="265"/>
+            <ac:spMk id="59" creationId="{7CB506AB-EDE8-8114-E642-4C505554ADDE}"/>
+          </ac:spMkLst>
+        </pc:spChg>
+        <pc:spChg chg="del">
+          <ac:chgData name="Herrmann Maier" userId="daf89738-6842-4d38-a641-0f4c2c7a89f7" providerId="ADAL" clId="{52FF841C-F5DD-4FE6-B0EA-0F1F95B6D0F1}" dt="2024-06-23T16:48:10.196" v="235" actId="478"/>
+          <ac:spMkLst>
+            <pc:docMk/>
+            <pc:sldMk cId="2825963552" sldId="265"/>
+            <ac:spMk id="61" creationId="{5E63DF7E-0642-9767-71A9-05318AFE83FE}"/>
+          </ac:spMkLst>
+        </pc:spChg>
+        <pc:spChg chg="del">
+          <ac:chgData name="Herrmann Maier" userId="daf89738-6842-4d38-a641-0f4c2c7a89f7" providerId="ADAL" clId="{52FF841C-F5DD-4FE6-B0EA-0F1F95B6D0F1}" dt="2024-06-23T16:48:10.196" v="235" actId="478"/>
+          <ac:spMkLst>
+            <pc:docMk/>
+            <pc:sldMk cId="2825963552" sldId="265"/>
+            <ac:spMk id="62" creationId="{91580994-1E70-F3AF-9A24-648B2FDB7E98}"/>
+          </ac:spMkLst>
+        </pc:spChg>
+        <pc:spChg chg="mod">
+          <ac:chgData name="Herrmann Maier" userId="daf89738-6842-4d38-a641-0f4c2c7a89f7" providerId="ADAL" clId="{52FF841C-F5DD-4FE6-B0EA-0F1F95B6D0F1}" dt="2024-06-23T16:48:26.270" v="243" actId="1076"/>
+          <ac:spMkLst>
+            <pc:docMk/>
+            <pc:sldMk cId="2825963552" sldId="265"/>
+            <ac:spMk id="63" creationId="{13F5BCFC-EA30-2637-4146-BACE62E9A46F}"/>
+          </ac:spMkLst>
+        </pc:spChg>
+        <pc:spChg chg="mod">
+          <ac:chgData name="Herrmann Maier" userId="daf89738-6842-4d38-a641-0f4c2c7a89f7" providerId="ADAL" clId="{52FF841C-F5DD-4FE6-B0EA-0F1F95B6D0F1}" dt="2024-06-23T16:47:35.294" v="211" actId="20577"/>
+          <ac:spMkLst>
+            <pc:docMk/>
+            <pc:sldMk cId="2825963552" sldId="265"/>
+            <ac:spMk id="66" creationId="{7570E7DC-8A54-D707-021F-AA47609F32FE}"/>
+          </ac:spMkLst>
+        </pc:spChg>
+        <pc:spChg chg="mod">
+          <ac:chgData name="Herrmann Maier" userId="daf89738-6842-4d38-a641-0f4c2c7a89f7" providerId="ADAL" clId="{52FF841C-F5DD-4FE6-B0EA-0F1F95B6D0F1}" dt="2024-06-23T16:47:21.368" v="199" actId="20577"/>
+          <ac:spMkLst>
+            <pc:docMk/>
+            <pc:sldMk cId="2825963552" sldId="265"/>
+            <ac:spMk id="97" creationId="{0E6D7507-0E22-DACD-F110-6942ECBD7995}"/>
+          </ac:spMkLst>
+        </pc:spChg>
+        <pc:spChg chg="mod">
+          <ac:chgData name="Herrmann Maier" userId="daf89738-6842-4d38-a641-0f4c2c7a89f7" providerId="ADAL" clId="{52FF841C-F5DD-4FE6-B0EA-0F1F95B6D0F1}" dt="2024-06-23T16:46:40.169" v="145" actId="20577"/>
+          <ac:spMkLst>
+            <pc:docMk/>
+            <pc:sldMk cId="2825963552" sldId="265"/>
+            <ac:spMk id="117" creationId="{F89EC467-852E-038D-8AAA-BB9D210C9248}"/>
+          </ac:spMkLst>
+        </pc:spChg>
+        <pc:spChg chg="mod">
+          <ac:chgData name="Herrmann Maier" userId="daf89738-6842-4d38-a641-0f4c2c7a89f7" providerId="ADAL" clId="{52FF841C-F5DD-4FE6-B0EA-0F1F95B6D0F1}" dt="2024-06-23T16:46:43.380" v="146" actId="20577"/>
+          <ac:spMkLst>
+            <pc:docMk/>
+            <pc:sldMk cId="2825963552" sldId="265"/>
+            <ac:spMk id="118" creationId="{82F7298C-1312-4103-9801-4796197483B0}"/>
+          </ac:spMkLst>
+        </pc:spChg>
+        <pc:spChg chg="mod">
+          <ac:chgData name="Herrmann Maier" userId="daf89738-6842-4d38-a641-0f4c2c7a89f7" providerId="ADAL" clId="{52FF841C-F5DD-4FE6-B0EA-0F1F95B6D0F1}" dt="2024-06-23T16:47:25.666" v="200" actId="20577"/>
+          <ac:spMkLst>
+            <pc:docMk/>
+            <pc:sldMk cId="2825963552" sldId="265"/>
+            <ac:spMk id="119" creationId="{47999D74-5005-A028-3396-D603DC9515F8}"/>
+          </ac:spMkLst>
+        </pc:spChg>
+        <pc:spChg chg="del">
+          <ac:chgData name="Herrmann Maier" userId="daf89738-6842-4d38-a641-0f4c2c7a89f7" providerId="ADAL" clId="{52FF841C-F5DD-4FE6-B0EA-0F1F95B6D0F1}" dt="2024-06-23T16:46:30.892" v="141" actId="478"/>
+          <ac:spMkLst>
+            <pc:docMk/>
+            <pc:sldMk cId="2825963552" sldId="265"/>
+            <ac:spMk id="121" creationId="{5A882BF5-9271-4ADF-CA2A-552E81585AB4}"/>
+          </ac:spMkLst>
+        </pc:spChg>
+        <pc:spChg chg="del">
+          <ac:chgData name="Herrmann Maier" userId="daf89738-6842-4d38-a641-0f4c2c7a89f7" providerId="ADAL" clId="{52FF841C-F5DD-4FE6-B0EA-0F1F95B6D0F1}" dt="2024-06-23T16:46:32.993" v="144" actId="478"/>
+          <ac:spMkLst>
+            <pc:docMk/>
+            <pc:sldMk cId="2825963552" sldId="265"/>
+            <ac:spMk id="122" creationId="{1D879D93-0AC6-F543-27A2-9BC838B4E1DB}"/>
+          </ac:spMkLst>
+        </pc:spChg>
+        <pc:spChg chg="mod">
+          <ac:chgData name="Herrmann Maier" userId="daf89738-6842-4d38-a641-0f4c2c7a89f7" providerId="ADAL" clId="{52FF841C-F5DD-4FE6-B0EA-0F1F95B6D0F1}" dt="2024-06-23T16:47:31.054" v="208" actId="20577"/>
+          <ac:spMkLst>
+            <pc:docMk/>
+            <pc:sldMk cId="2825963552" sldId="265"/>
+            <ac:spMk id="129" creationId="{CC914E5B-2D1C-A917-9A29-C5A45B91FC05}"/>
+          </ac:spMkLst>
+        </pc:spChg>
+        <pc:cxnChg chg="mod">
+          <ac:chgData name="Herrmann Maier" userId="daf89738-6842-4d38-a641-0f4c2c7a89f7" providerId="ADAL" clId="{52FF841C-F5DD-4FE6-B0EA-0F1F95B6D0F1}" dt="2024-06-23T16:46:18.278" v="129" actId="14100"/>
+          <ac:cxnSpMkLst>
+            <pc:docMk/>
+            <pc:sldMk cId="2825963552" sldId="265"/>
+            <ac:cxnSpMk id="19" creationId="{AF1CF559-0887-48AE-6CF0-4817110402FE}"/>
+          </ac:cxnSpMkLst>
+        </pc:cxnChg>
+        <pc:cxnChg chg="mod">
+          <ac:chgData name="Herrmann Maier" userId="daf89738-6842-4d38-a641-0f4c2c7a89f7" providerId="ADAL" clId="{52FF841C-F5DD-4FE6-B0EA-0F1F95B6D0F1}" dt="2024-06-23T16:46:09.480" v="127" actId="14100"/>
+          <ac:cxnSpMkLst>
+            <pc:docMk/>
+            <pc:sldMk cId="2825963552" sldId="265"/>
+            <ac:cxnSpMk id="22" creationId="{DAC83EC4-3351-6BAF-B9E8-08E35E9932DE}"/>
+          </ac:cxnSpMkLst>
+        </pc:cxnChg>
+        <pc:cxnChg chg="del mod">
+          <ac:chgData name="Herrmann Maier" userId="daf89738-6842-4d38-a641-0f4c2c7a89f7" providerId="ADAL" clId="{52FF841C-F5DD-4FE6-B0EA-0F1F95B6D0F1}" dt="2024-06-23T16:45:56.503" v="117" actId="478"/>
+          <ac:cxnSpMkLst>
+            <pc:docMk/>
+            <pc:sldMk cId="2825963552" sldId="265"/>
+            <ac:cxnSpMk id="25" creationId="{8F69E09C-D493-0CA5-3A9E-8B4DBAEA5A2E}"/>
+          </ac:cxnSpMkLst>
+        </pc:cxnChg>
+        <pc:cxnChg chg="del mod">
+          <ac:chgData name="Herrmann Maier" userId="daf89738-6842-4d38-a641-0f4c2c7a89f7" providerId="ADAL" clId="{52FF841C-F5DD-4FE6-B0EA-0F1F95B6D0F1}" dt="2024-06-23T16:45:57.281" v="118" actId="478"/>
+          <ac:cxnSpMkLst>
+            <pc:docMk/>
+            <pc:sldMk cId="2825963552" sldId="265"/>
+            <ac:cxnSpMk id="28" creationId="{4728EA80-CA18-0BD8-EE9E-7043B0A8824F}"/>
+          </ac:cxnSpMkLst>
+        </pc:cxnChg>
+        <pc:cxnChg chg="del mod">
+          <ac:chgData name="Herrmann Maier" userId="daf89738-6842-4d38-a641-0f4c2c7a89f7" providerId="ADAL" clId="{52FF841C-F5DD-4FE6-B0EA-0F1F95B6D0F1}" dt="2024-06-23T16:46:02.279" v="121" actId="478"/>
+          <ac:cxnSpMkLst>
+            <pc:docMk/>
+            <pc:sldMk cId="2825963552" sldId="265"/>
+            <ac:cxnSpMk id="31" creationId="{4C89A1CD-4345-1BED-B2F5-B045B57F9511}"/>
+          </ac:cxnSpMkLst>
+        </pc:cxnChg>
+        <pc:cxnChg chg="del mod">
+          <ac:chgData name="Herrmann Maier" userId="daf89738-6842-4d38-a641-0f4c2c7a89f7" providerId="ADAL" clId="{52FF841C-F5DD-4FE6-B0EA-0F1F95B6D0F1}" dt="2024-06-23T16:46:02.820" v="122" actId="478"/>
+          <ac:cxnSpMkLst>
+            <pc:docMk/>
+            <pc:sldMk cId="2825963552" sldId="265"/>
+            <ac:cxnSpMk id="34" creationId="{A745C720-0F3D-73A8-032F-070D96DC8AC2}"/>
+          </ac:cxnSpMkLst>
+        </pc:cxnChg>
+        <pc:cxnChg chg="del mod">
+          <ac:chgData name="Herrmann Maier" userId="daf89738-6842-4d38-a641-0f4c2c7a89f7" providerId="ADAL" clId="{52FF841C-F5DD-4FE6-B0EA-0F1F95B6D0F1}" dt="2024-06-23T16:46:03.529" v="123" actId="478"/>
+          <ac:cxnSpMkLst>
+            <pc:docMk/>
+            <pc:sldMk cId="2825963552" sldId="265"/>
+            <ac:cxnSpMk id="37" creationId="{88A00574-3ACC-7A42-051B-0C5D19A71689}"/>
+          </ac:cxnSpMkLst>
+        </pc:cxnChg>
+        <pc:cxnChg chg="del mod">
+          <ac:chgData name="Herrmann Maier" userId="daf89738-6842-4d38-a641-0f4c2c7a89f7" providerId="ADAL" clId="{52FF841C-F5DD-4FE6-B0EA-0F1F95B6D0F1}" dt="2024-06-23T16:46:04.169" v="124" actId="478"/>
+          <ac:cxnSpMkLst>
+            <pc:docMk/>
+            <pc:sldMk cId="2825963552" sldId="265"/>
+            <ac:cxnSpMk id="40" creationId="{29052857-5DF7-5CC6-4964-A2E63A032E17}"/>
+          </ac:cxnSpMkLst>
+        </pc:cxnChg>
+        <pc:cxnChg chg="mod">
+          <ac:chgData name="Herrmann Maier" userId="daf89738-6842-4d38-a641-0f4c2c7a89f7" providerId="ADAL" clId="{52FF841C-F5DD-4FE6-B0EA-0F1F95B6D0F1}" dt="2024-06-23T16:48:33.338" v="246" actId="14100"/>
+          <ac:cxnSpMkLst>
+            <pc:docMk/>
+            <pc:sldMk cId="2825963552" sldId="265"/>
+            <ac:cxnSpMk id="71" creationId="{4183CE83-C10B-B863-CB5F-E7965D41FBA7}"/>
+          </ac:cxnSpMkLst>
+        </pc:cxnChg>
+        <pc:cxnChg chg="mod">
+          <ac:chgData name="Herrmann Maier" userId="daf89738-6842-4d38-a641-0f4c2c7a89f7" providerId="ADAL" clId="{52FF841C-F5DD-4FE6-B0EA-0F1F95B6D0F1}" dt="2024-06-23T16:48:28.554" v="244" actId="14100"/>
+          <ac:cxnSpMkLst>
+            <pc:docMk/>
+            <pc:sldMk cId="2825963552" sldId="265"/>
+            <ac:cxnSpMk id="72" creationId="{95576CF0-A7E7-8638-CF84-4751AF153792}"/>
+          </ac:cxnSpMkLst>
+        </pc:cxnChg>
+        <pc:cxnChg chg="del mod">
+          <ac:chgData name="Herrmann Maier" userId="daf89738-6842-4d38-a641-0f4c2c7a89f7" providerId="ADAL" clId="{52FF841C-F5DD-4FE6-B0EA-0F1F95B6D0F1}" dt="2024-06-23T16:48:12.101" v="237" actId="478"/>
+          <ac:cxnSpMkLst>
+            <pc:docMk/>
+            <pc:sldMk cId="2825963552" sldId="265"/>
+            <ac:cxnSpMk id="73" creationId="{DE18B87D-FFBF-DF35-66CD-F93B3D9AFBFA}"/>
+          </ac:cxnSpMkLst>
+        </pc:cxnChg>
+        <pc:cxnChg chg="del mod">
+          <ac:chgData name="Herrmann Maier" userId="daf89738-6842-4d38-a641-0f4c2c7a89f7" providerId="ADAL" clId="{52FF841C-F5DD-4FE6-B0EA-0F1F95B6D0F1}" dt="2024-06-23T16:48:11.068" v="236" actId="478"/>
+          <ac:cxnSpMkLst>
+            <pc:docMk/>
+            <pc:sldMk cId="2825963552" sldId="265"/>
+            <ac:cxnSpMk id="74" creationId="{75B1A021-A7A7-38CA-1C04-1D15B9815677}"/>
+          </ac:cxnSpMkLst>
+        </pc:cxnChg>
+        <pc:cxnChg chg="mod">
+          <ac:chgData name="Herrmann Maier" userId="daf89738-6842-4d38-a641-0f4c2c7a89f7" providerId="ADAL" clId="{52FF841C-F5DD-4FE6-B0EA-0F1F95B6D0F1}" dt="2024-06-23T16:47:14.290" v="194" actId="14100"/>
+          <ac:cxnSpMkLst>
+            <pc:docMk/>
+            <pc:sldMk cId="2825963552" sldId="265"/>
+            <ac:cxnSpMk id="107" creationId="{AAFF8750-5AC5-C4BA-DB11-2D65C9E3E379}"/>
+          </ac:cxnSpMkLst>
+        </pc:cxnChg>
+        <pc:cxnChg chg="del mod">
+          <ac:chgData name="Herrmann Maier" userId="daf89738-6842-4d38-a641-0f4c2c7a89f7" providerId="ADAL" clId="{52FF841C-F5DD-4FE6-B0EA-0F1F95B6D0F1}" dt="2024-06-23T16:46:31.670" v="142" actId="478"/>
+          <ac:cxnSpMkLst>
+            <pc:docMk/>
+            <pc:sldMk cId="2825963552" sldId="265"/>
+            <ac:cxnSpMk id="123" creationId="{25CFA682-A4C2-5E64-CB94-EAD41A02DF6D}"/>
+          </ac:cxnSpMkLst>
+        </pc:cxnChg>
+        <pc:cxnChg chg="del mod">
+          <ac:chgData name="Herrmann Maier" userId="daf89738-6842-4d38-a641-0f4c2c7a89f7" providerId="ADAL" clId="{52FF841C-F5DD-4FE6-B0EA-0F1F95B6D0F1}" dt="2024-06-23T16:46:32.395" v="143" actId="478"/>
+          <ac:cxnSpMkLst>
+            <pc:docMk/>
+            <pc:sldMk cId="2825963552" sldId="265"/>
+            <ac:cxnSpMk id="126" creationId="{E39282DA-617F-F637-868F-83EFE61041A6}"/>
+          </ac:cxnSpMkLst>
+        </pc:cxnChg>
+      </pc:sldChg>
+    </pc:docChg>
+  </pc:docChgLst>
   <pc:docChgLst>
     <pc:chgData name="Herrmann Maier" userId="daf89738-6842-4d38-a641-0f4c2c7a89f7" providerId="ADAL" clId="{0317CFAF-5F3A-4A6A-A4BD-43FB72A63F57}"/>
     <pc:docChg chg="undo custSel addSld delSld modSld sldOrd">
@@ -4194,7 +4883,7 @@
           <a:p>
             <a:pPr algn="ctr"/>
             <a:r>
-              <a:rPr lang="de-DE" dirty="0">
+              <a:rPr lang="de-DE" dirty="0" err="1">
                 <a:ln w="0"/>
                 <a:solidFill>
                   <a:schemeClr val="tx1"/>
@@ -4207,7 +4896,7 @@
                   </a:outerShdw>
                 </a:effectLst>
               </a:rPr>
-              <a:t>klasse</a:t>
+              <a:t>klassen</a:t>
             </a:r>
             <a:endParaRPr lang="de-DE" dirty="0"/>
           </a:p>
@@ -4280,7 +4969,7 @@
                   </a:outerShdw>
                 </a:effectLst>
               </a:rPr>
-              <a:t>abteilung</a:t>
+              <a:t>abteilungen</a:t>
             </a:r>
             <a:endParaRPr lang="de-DE" dirty="0"/>
           </a:p>
@@ -7079,7 +7768,7 @@
                   </a:outerShdw>
                 </a:effectLst>
               </a:rPr>
-              <a:t>kunde</a:t>
+              <a:t>kunden</a:t>
             </a:r>
             <a:endParaRPr lang="de-DE" dirty="0"/>
           </a:p>
@@ -7152,7 +7841,7 @@
                   </a:outerShdw>
                 </a:effectLst>
               </a:rPr>
-              <a:t>bestellung</a:t>
+              <a:t>bestellungen</a:t>
             </a:r>
             <a:endParaRPr lang="de-DE" dirty="0"/>
           </a:p>
@@ -8779,7 +9468,7 @@
                   </a:outerShdw>
                 </a:effectLst>
               </a:rPr>
-              <a:t>rechnung</a:t>
+              <a:t>rechnungen</a:t>
             </a:r>
             <a:endParaRPr lang="de-DE" dirty="0"/>
           </a:p>
@@ -9683,7 +10372,7 @@
           <a:p>
             <a:pPr algn="ctr"/>
             <a:r>
-              <a:rPr lang="de-DE" dirty="0">
+              <a:rPr lang="de-DE" dirty="0" err="1">
                 <a:ln w="0"/>
                 <a:solidFill>
                   <a:schemeClr val="tx1"/>
@@ -9696,7 +10385,7 @@
                   </a:outerShdw>
                 </a:effectLst>
               </a:rPr>
-              <a:t>Land</a:t>
+              <a:t>länder</a:t>
             </a:r>
             <a:endParaRPr lang="de-DE" dirty="0"/>
           </a:p>
@@ -9788,8 +10477,8 @@
         </p:nvSpPr>
         <p:spPr>
           <a:xfrm>
-            <a:off x="8509000" y="762000"/>
-            <a:ext cx="1295400" cy="635000"/>
+            <a:off x="8508999" y="762000"/>
+            <a:ext cx="1444897" cy="635000"/>
           </a:xfrm>
           <a:prstGeom prst="rect">
             <a:avLst/>
@@ -9828,7 +10517,7 @@
           <a:p>
             <a:pPr algn="ctr"/>
             <a:r>
-              <a:rPr lang="de-DE" dirty="0">
+              <a:rPr lang="de-DE" dirty="0" err="1">
                 <a:ln w="0"/>
                 <a:solidFill>
                   <a:schemeClr val="tx1"/>
@@ -9841,7 +10530,7 @@
                   </a:outerShdw>
                 </a:effectLst>
               </a:rPr>
-              <a:t>Hauptstadt</a:t>
+              <a:t>hauptstädte</a:t>
             </a:r>
             <a:endParaRPr lang="de-DE" dirty="0"/>
           </a:p>
@@ -9911,7 +10600,7 @@
         <p:spPr>
           <a:xfrm flipH="1">
             <a:off x="7251700" y="1079500"/>
-            <a:ext cx="1257300" cy="0"/>
+            <a:ext cx="1257299" cy="0"/>
           </a:xfrm>
           <a:prstGeom prst="line">
             <a:avLst/>
@@ -10061,7 +10750,7 @@
           <a:p>
             <a:pPr algn="ctr"/>
             <a:r>
-              <a:rPr lang="de-DE" dirty="0">
+              <a:rPr lang="de-DE" dirty="0" err="1">
                 <a:ln w="0"/>
                 <a:solidFill>
                   <a:schemeClr val="tx1"/>
@@ -10074,7 +10763,7 @@
                   </a:outerShdw>
                 </a:effectLst>
               </a:rPr>
-              <a:t>Schüler</a:t>
+              <a:t>schüler</a:t>
             </a:r>
             <a:endParaRPr lang="de-DE" dirty="0"/>
           </a:p>
@@ -10206,7 +10895,7 @@
           <a:p>
             <a:pPr algn="ctr"/>
             <a:r>
-              <a:rPr lang="de-DE" dirty="0">
+              <a:rPr lang="de-DE" dirty="0" err="1">
                 <a:ln w="0"/>
                 <a:solidFill>
                   <a:schemeClr val="tx1"/>
@@ -10219,7 +10908,7 @@
                   </a:outerShdw>
                 </a:effectLst>
               </a:rPr>
-              <a:t>Klasse</a:t>
+              <a:t>klassen</a:t>
             </a:r>
             <a:endParaRPr lang="de-DE" dirty="0"/>
           </a:p>
@@ -10439,7 +11128,7 @@
           <a:p>
             <a:pPr algn="ctr"/>
             <a:r>
-              <a:rPr lang="de-DE" dirty="0">
+              <a:rPr lang="de-DE" dirty="0" err="1">
                 <a:ln w="0"/>
                 <a:solidFill>
                   <a:schemeClr val="tx1"/>
@@ -10452,7 +11141,7 @@
                   </a:outerShdw>
                 </a:effectLst>
               </a:rPr>
-              <a:t>Mitarbeiter</a:t>
+              <a:t>mitarbeiter</a:t>
             </a:r>
             <a:endParaRPr lang="de-DE" dirty="0"/>
           </a:p>
@@ -10584,7 +11273,7 @@
           <a:p>
             <a:pPr algn="ctr"/>
             <a:r>
-              <a:rPr lang="de-DE" dirty="0">
+              <a:rPr lang="de-DE" dirty="0" err="1">
                 <a:ln w="0"/>
                 <a:solidFill>
                   <a:schemeClr val="tx1"/>
@@ -10597,7 +11286,7 @@
                   </a:outerShdw>
                 </a:effectLst>
               </a:rPr>
-              <a:t>Projekt</a:t>
+              <a:t>projekte</a:t>
             </a:r>
             <a:endParaRPr lang="de-DE" dirty="0"/>
           </a:p>
@@ -10860,7 +11549,7 @@
                   </a:outerShdw>
                 </a:effectLst>
               </a:rPr>
-              <a:t>kunde</a:t>
+              <a:t>kunden</a:t>
             </a:r>
             <a:endParaRPr lang="de-DE" dirty="0"/>
           </a:p>
@@ -10933,7 +11622,7 @@
                   </a:outerShdw>
                 </a:effectLst>
               </a:rPr>
-              <a:t>fahrrad</a:t>
+              <a:t>fahrräder</a:t>
             </a:r>
             <a:endParaRPr lang="de-DE" dirty="0"/>
           </a:p>
@@ -11733,7 +12422,7 @@
                   </a:outerShdw>
                 </a:effectLst>
               </a:rPr>
-              <a:t>kunde</a:t>
+              <a:t>kunden</a:t>
             </a:r>
             <a:endParaRPr lang="de-DE" dirty="0"/>
           </a:p>
@@ -11806,7 +12495,7 @@
                   </a:outerShdw>
                 </a:effectLst>
               </a:rPr>
-              <a:t>auto</a:t>
+              <a:t>autos</a:t>
             </a:r>
             <a:endParaRPr lang="de-DE" dirty="0"/>
           </a:p>
@@ -13646,7 +14335,7 @@
                   </a:outerShdw>
                 </a:effectLst>
               </a:rPr>
-              <a:t>filiale</a:t>
+              <a:t>filialen</a:t>
             </a:r>
             <a:endParaRPr lang="de-DE" dirty="0"/>
           </a:p>
@@ -13706,7 +14395,7 @@
           <a:p>
             <a:pPr algn="ctr"/>
             <a:r>
-              <a:rPr lang="de-DE" dirty="0">
+              <a:rPr lang="de-DE" dirty="0" err="1">
                 <a:ln w="0"/>
                 <a:solidFill>
                   <a:schemeClr val="tx1"/>
@@ -13719,7 +14408,7 @@
                   </a:outerShdw>
                 </a:effectLst>
               </a:rPr>
-              <a:t>medium</a:t>
+              <a:t>medien</a:t>
             </a:r>
             <a:endParaRPr lang="de-DE" dirty="0"/>
           </a:p>
@@ -14519,7 +15208,7 @@
                   </a:outerShdw>
                 </a:effectLst>
               </a:rPr>
-              <a:t>kunde</a:t>
+              <a:t>kunden</a:t>
             </a:r>
             <a:endParaRPr lang="de-DE" dirty="0"/>
           </a:p>
@@ -17278,7 +17967,7 @@
                   </a:outerShdw>
                 </a:effectLst>
               </a:rPr>
-              <a:t>kurs</a:t>
+              <a:t>kurse</a:t>
             </a:r>
             <a:endParaRPr lang="de-DE" sz="1400" dirty="0"/>
           </a:p>
@@ -19354,7 +20043,7 @@
           <a:p>
             <a:pPr algn="ctr"/>
             <a:r>
-              <a:rPr lang="de-DE" dirty="0">
+              <a:rPr lang="de-DE" dirty="0" err="1">
                 <a:ln w="0"/>
                 <a:solidFill>
                   <a:schemeClr val="tx1"/>
@@ -19367,7 +20056,7 @@
                   </a:outerShdw>
                 </a:effectLst>
               </a:rPr>
-              <a:t>klasse</a:t>
+              <a:t>klassen</a:t>
             </a:r>
             <a:endParaRPr lang="de-DE" dirty="0"/>
           </a:p>
@@ -20818,6 +21507,1969 @@
     <p:extLst>
       <p:ext uri="{BB962C8B-B14F-4D97-AF65-F5344CB8AC3E}">
         <p14:creationId xmlns:p14="http://schemas.microsoft.com/office/powerpoint/2010/main" val="891319327"/>
+      </p:ext>
+    </p:extLst>
+  </p:cSld>
+  <p:clrMapOvr>
+    <a:masterClrMapping/>
+  </p:clrMapOvr>
+</p:sld>
+</file>
+
+<file path=ppt/slides/slide9.xml><?xml version="1.0" encoding="utf-8"?>
+<p:sld xmlns:a="http://schemas.openxmlformats.org/drawingml/2006/main" xmlns:r="http://schemas.openxmlformats.org/officeDocument/2006/relationships" xmlns:p="http://schemas.openxmlformats.org/presentationml/2006/main">
+  <p:cSld>
+    <p:spTree>
+      <p:nvGrpSpPr>
+        <p:cNvPr id="1" name=""/>
+        <p:cNvGrpSpPr/>
+        <p:nvPr/>
+      </p:nvGrpSpPr>
+      <p:grpSpPr>
+        <a:xfrm>
+          <a:off x="0" y="0"/>
+          <a:ext cx="0" cy="0"/>
+          <a:chOff x="0" y="0"/>
+          <a:chExt cx="0" cy="0"/>
+        </a:xfrm>
+      </p:grpSpPr>
+      <p:sp>
+        <p:nvSpPr>
+          <p:cNvPr id="4" name="Rechteck 3">
+            <a:extLst>
+              <a:ext uri="{FF2B5EF4-FFF2-40B4-BE49-F238E27FC236}">
+                <a16:creationId xmlns:a16="http://schemas.microsoft.com/office/drawing/2014/main" id="{D0E8120F-626E-CAB7-16F4-50F853817B03}"/>
+              </a:ext>
+            </a:extLst>
+          </p:cNvPr>
+          <p:cNvSpPr/>
+          <p:nvPr/>
+        </p:nvSpPr>
+        <p:spPr>
+          <a:xfrm>
+            <a:off x="2378075" y="1549400"/>
+            <a:ext cx="841375" cy="390525"/>
+          </a:xfrm>
+          <a:prstGeom prst="rect">
+            <a:avLst/>
+          </a:prstGeom>
+          <a:solidFill>
+            <a:schemeClr val="accent1">
+              <a:lumMod val="40000"/>
+              <a:lumOff val="60000"/>
+            </a:schemeClr>
+          </a:solidFill>
+          <a:ln>
+            <a:solidFill>
+              <a:schemeClr val="tx1"/>
+            </a:solidFill>
+          </a:ln>
+        </p:spPr>
+        <p:style>
+          <a:lnRef idx="2">
+            <a:schemeClr val="accent1">
+              <a:shade val="15000"/>
+            </a:schemeClr>
+          </a:lnRef>
+          <a:fillRef idx="1">
+            <a:schemeClr val="accent1"/>
+          </a:fillRef>
+          <a:effectRef idx="0">
+            <a:schemeClr val="accent1"/>
+          </a:effectRef>
+          <a:fontRef idx="minor">
+            <a:schemeClr val="lt1"/>
+          </a:fontRef>
+        </p:style>
+        <p:txBody>
+          <a:bodyPr rtlCol="0" anchor="ctr"/>
+          <a:lstStyle/>
+          <a:p>
+            <a:pPr algn="ctr"/>
+            <a:r>
+              <a:rPr lang="de-DE" sz="1400" dirty="0" err="1">
+                <a:ln w="0"/>
+                <a:solidFill>
+                  <a:schemeClr val="tx1"/>
+                </a:solidFill>
+                <a:effectLst>
+                  <a:outerShdw blurRad="38100" dist="19050" dir="2700000" algn="tl" rotWithShape="0">
+                    <a:schemeClr val="dk1">
+                      <a:alpha val="40000"/>
+                    </a:schemeClr>
+                  </a:outerShdw>
+                </a:effectLst>
+              </a:rPr>
+              <a:t>ressorts</a:t>
+            </a:r>
+            <a:endParaRPr lang="de-DE" sz="1400" dirty="0"/>
+          </a:p>
+        </p:txBody>
+      </p:sp>
+      <p:sp>
+        <p:nvSpPr>
+          <p:cNvPr id="5" name="Raute 4">
+            <a:extLst>
+              <a:ext uri="{FF2B5EF4-FFF2-40B4-BE49-F238E27FC236}">
+                <a16:creationId xmlns:a16="http://schemas.microsoft.com/office/drawing/2014/main" id="{B9A24DD7-C17B-B463-1362-0CF1D5876416}"/>
+              </a:ext>
+            </a:extLst>
+          </p:cNvPr>
+          <p:cNvSpPr/>
+          <p:nvPr/>
+        </p:nvSpPr>
+        <p:spPr>
+          <a:xfrm>
+            <a:off x="4050413" y="1455738"/>
+            <a:ext cx="1765300" cy="577850"/>
+          </a:xfrm>
+          <a:prstGeom prst="diamond">
+            <a:avLst/>
+          </a:prstGeom>
+          <a:solidFill>
+            <a:schemeClr val="accent6">
+              <a:lumMod val="40000"/>
+              <a:lumOff val="60000"/>
+            </a:schemeClr>
+          </a:solidFill>
+          <a:ln>
+            <a:solidFill>
+              <a:schemeClr val="tx1"/>
+            </a:solidFill>
+          </a:ln>
+        </p:spPr>
+        <p:style>
+          <a:lnRef idx="2">
+            <a:schemeClr val="accent1">
+              <a:shade val="15000"/>
+            </a:schemeClr>
+          </a:lnRef>
+          <a:fillRef idx="1">
+            <a:schemeClr val="accent1"/>
+          </a:fillRef>
+          <a:effectRef idx="0">
+            <a:schemeClr val="accent1"/>
+          </a:effectRef>
+          <a:fontRef idx="minor">
+            <a:schemeClr val="lt1"/>
+          </a:fontRef>
+        </p:style>
+        <p:txBody>
+          <a:bodyPr rtlCol="0" anchor="ctr"/>
+          <a:lstStyle/>
+          <a:p>
+            <a:pPr algn="ctr"/>
+            <a:r>
+              <a:rPr lang="de-DE" sz="1400" dirty="0">
+                <a:ln w="0"/>
+                <a:solidFill>
+                  <a:schemeClr val="tx1"/>
+                </a:solidFill>
+                <a:effectLst>
+                  <a:outerShdw blurRad="38100" dist="19050" dir="2700000" algn="tl" rotWithShape="0">
+                    <a:schemeClr val="dk1">
+                      <a:alpha val="40000"/>
+                    </a:schemeClr>
+                  </a:outerShdw>
+                </a:effectLst>
+              </a:rPr>
+              <a:t>gehört zu</a:t>
+            </a:r>
+          </a:p>
+        </p:txBody>
+      </p:sp>
+      <p:sp>
+        <p:nvSpPr>
+          <p:cNvPr id="12" name="Ellipse 11">
+            <a:extLst>
+              <a:ext uri="{FF2B5EF4-FFF2-40B4-BE49-F238E27FC236}">
+                <a16:creationId xmlns:a16="http://schemas.microsoft.com/office/drawing/2014/main" id="{D2DFCF98-0141-93BA-3C87-96DEBFA819AB}"/>
+              </a:ext>
+            </a:extLst>
+          </p:cNvPr>
+          <p:cNvSpPr/>
+          <p:nvPr/>
+        </p:nvSpPr>
+        <p:spPr>
+          <a:xfrm>
+            <a:off x="2050450" y="554494"/>
+            <a:ext cx="1447799" cy="390525"/>
+          </a:xfrm>
+          <a:prstGeom prst="ellipse">
+            <a:avLst/>
+          </a:prstGeom>
+          <a:solidFill>
+            <a:schemeClr val="accent4">
+              <a:lumMod val="40000"/>
+              <a:lumOff val="60000"/>
+            </a:schemeClr>
+          </a:solidFill>
+        </p:spPr>
+        <p:style>
+          <a:lnRef idx="2">
+            <a:schemeClr val="accent1">
+              <a:shade val="15000"/>
+            </a:schemeClr>
+          </a:lnRef>
+          <a:fillRef idx="1">
+            <a:schemeClr val="accent1"/>
+          </a:fillRef>
+          <a:effectRef idx="0">
+            <a:schemeClr val="accent1"/>
+          </a:effectRef>
+          <a:fontRef idx="minor">
+            <a:schemeClr val="lt1"/>
+          </a:fontRef>
+        </p:style>
+        <p:txBody>
+          <a:bodyPr rtlCol="0" anchor="ctr"/>
+          <a:lstStyle/>
+          <a:p>
+            <a:pPr algn="ctr"/>
+            <a:r>
+              <a:rPr lang="de-DE" sz="1400" u="sng" dirty="0" err="1">
+                <a:ln w="0"/>
+                <a:solidFill>
+                  <a:schemeClr val="tx1"/>
+                </a:solidFill>
+                <a:effectLst>
+                  <a:outerShdw blurRad="38100" dist="19050" dir="2700000" algn="tl" rotWithShape="0">
+                    <a:schemeClr val="dk1">
+                      <a:alpha val="40000"/>
+                    </a:schemeClr>
+                  </a:outerShdw>
+                </a:effectLst>
+              </a:rPr>
+              <a:t>ressortNR</a:t>
+            </a:r>
+            <a:endParaRPr lang="de-DE" sz="1400" u="sng" dirty="0">
+              <a:ln w="0"/>
+              <a:solidFill>
+                <a:schemeClr val="tx1"/>
+              </a:solidFill>
+              <a:effectLst>
+                <a:outerShdw blurRad="38100" dist="19050" dir="2700000" algn="tl" rotWithShape="0">
+                  <a:schemeClr val="dk1">
+                    <a:alpha val="40000"/>
+                  </a:schemeClr>
+                </a:outerShdw>
+              </a:effectLst>
+            </a:endParaRPr>
+          </a:p>
+        </p:txBody>
+      </p:sp>
+      <p:sp>
+        <p:nvSpPr>
+          <p:cNvPr id="16" name="Ellipse 15">
+            <a:extLst>
+              <a:ext uri="{FF2B5EF4-FFF2-40B4-BE49-F238E27FC236}">
+                <a16:creationId xmlns:a16="http://schemas.microsoft.com/office/drawing/2014/main" id="{DE5C2875-BCE3-A716-30D6-06430593A61F}"/>
+              </a:ext>
+            </a:extLst>
+          </p:cNvPr>
+          <p:cNvSpPr/>
+          <p:nvPr/>
+        </p:nvSpPr>
+        <p:spPr>
+          <a:xfrm>
+            <a:off x="450057" y="780951"/>
+            <a:ext cx="1560159" cy="390525"/>
+          </a:xfrm>
+          <a:prstGeom prst="ellipse">
+            <a:avLst/>
+          </a:prstGeom>
+          <a:solidFill>
+            <a:schemeClr val="accent4">
+              <a:lumMod val="40000"/>
+              <a:lumOff val="60000"/>
+            </a:schemeClr>
+          </a:solidFill>
+        </p:spPr>
+        <p:style>
+          <a:lnRef idx="2">
+            <a:schemeClr val="accent1">
+              <a:shade val="15000"/>
+            </a:schemeClr>
+          </a:lnRef>
+          <a:fillRef idx="1">
+            <a:schemeClr val="accent1"/>
+          </a:fillRef>
+          <a:effectRef idx="0">
+            <a:schemeClr val="accent1"/>
+          </a:effectRef>
+          <a:fontRef idx="minor">
+            <a:schemeClr val="lt1"/>
+          </a:fontRef>
+        </p:style>
+        <p:txBody>
+          <a:bodyPr rtlCol="0" anchor="ctr"/>
+          <a:lstStyle/>
+          <a:p>
+            <a:pPr algn="ctr"/>
+            <a:r>
+              <a:rPr lang="de-DE" sz="1400" dirty="0" err="1">
+                <a:ln w="0"/>
+                <a:solidFill>
+                  <a:schemeClr val="tx1"/>
+                </a:solidFill>
+                <a:effectLst>
+                  <a:outerShdw blurRad="38100" dist="19050" dir="2700000" algn="tl" rotWithShape="0">
+                    <a:schemeClr val="dk1">
+                      <a:alpha val="40000"/>
+                    </a:schemeClr>
+                  </a:outerShdw>
+                </a:effectLst>
+              </a:rPr>
+              <a:t>bezeichnung</a:t>
+            </a:r>
+            <a:endParaRPr lang="de-DE" sz="1400" dirty="0">
+              <a:ln w="0"/>
+              <a:solidFill>
+                <a:schemeClr val="tx1"/>
+              </a:solidFill>
+              <a:effectLst>
+                <a:outerShdw blurRad="38100" dist="19050" dir="2700000" algn="tl" rotWithShape="0">
+                  <a:schemeClr val="dk1">
+                    <a:alpha val="40000"/>
+                  </a:schemeClr>
+                </a:outerShdw>
+              </a:effectLst>
+            </a:endParaRPr>
+          </a:p>
+        </p:txBody>
+      </p:sp>
+      <p:cxnSp>
+        <p:nvCxnSpPr>
+          <p:cNvPr id="19" name="Gerader Verbinder 18">
+            <a:extLst>
+              <a:ext uri="{FF2B5EF4-FFF2-40B4-BE49-F238E27FC236}">
+                <a16:creationId xmlns:a16="http://schemas.microsoft.com/office/drawing/2014/main" id="{AF1CF559-0887-48AE-6CF0-4817110402FE}"/>
+              </a:ext>
+            </a:extLst>
+          </p:cNvPr>
+          <p:cNvCxnSpPr>
+            <a:cxnSpLocks/>
+            <a:stCxn id="12" idx="4"/>
+            <a:endCxn id="4" idx="0"/>
+          </p:cNvCxnSpPr>
+          <p:nvPr/>
+        </p:nvCxnSpPr>
+        <p:spPr>
+          <a:xfrm>
+            <a:off x="2774350" y="945019"/>
+            <a:ext cx="24413" cy="604381"/>
+          </a:xfrm>
+          <a:prstGeom prst="line">
+            <a:avLst/>
+          </a:prstGeom>
+          <a:ln w="19050">
+            <a:solidFill>
+              <a:schemeClr val="tx1"/>
+            </a:solidFill>
+          </a:ln>
+        </p:spPr>
+        <p:style>
+          <a:lnRef idx="1">
+            <a:schemeClr val="accent1"/>
+          </a:lnRef>
+          <a:fillRef idx="0">
+            <a:schemeClr val="accent1"/>
+          </a:fillRef>
+          <a:effectRef idx="0">
+            <a:schemeClr val="accent1"/>
+          </a:effectRef>
+          <a:fontRef idx="minor">
+            <a:schemeClr val="tx1"/>
+          </a:fontRef>
+        </p:style>
+      </p:cxnSp>
+      <p:cxnSp>
+        <p:nvCxnSpPr>
+          <p:cNvPr id="22" name="Gerader Verbinder 21">
+            <a:extLst>
+              <a:ext uri="{FF2B5EF4-FFF2-40B4-BE49-F238E27FC236}">
+                <a16:creationId xmlns:a16="http://schemas.microsoft.com/office/drawing/2014/main" id="{DAC83EC4-3351-6BAF-B9E8-08E35E9932DE}"/>
+              </a:ext>
+            </a:extLst>
+          </p:cNvPr>
+          <p:cNvCxnSpPr>
+            <a:cxnSpLocks/>
+            <a:stCxn id="16" idx="4"/>
+            <a:endCxn id="4" idx="0"/>
+          </p:cNvCxnSpPr>
+          <p:nvPr/>
+        </p:nvCxnSpPr>
+        <p:spPr>
+          <a:xfrm>
+            <a:off x="1230137" y="1171476"/>
+            <a:ext cx="1568626" cy="377924"/>
+          </a:xfrm>
+          <a:prstGeom prst="line">
+            <a:avLst/>
+          </a:prstGeom>
+          <a:ln w="19050">
+            <a:solidFill>
+              <a:schemeClr val="tx1"/>
+            </a:solidFill>
+          </a:ln>
+        </p:spPr>
+        <p:style>
+          <a:lnRef idx="1">
+            <a:schemeClr val="accent1"/>
+          </a:lnRef>
+          <a:fillRef idx="0">
+            <a:schemeClr val="accent1"/>
+          </a:fillRef>
+          <a:effectRef idx="0">
+            <a:schemeClr val="accent1"/>
+          </a:effectRef>
+          <a:fontRef idx="minor">
+            <a:schemeClr val="tx1"/>
+          </a:fontRef>
+        </p:style>
+      </p:cxnSp>
+      <p:sp>
+        <p:nvSpPr>
+          <p:cNvPr id="43" name="Rechteck 42">
+            <a:extLst>
+              <a:ext uri="{FF2B5EF4-FFF2-40B4-BE49-F238E27FC236}">
+                <a16:creationId xmlns:a16="http://schemas.microsoft.com/office/drawing/2014/main" id="{E34A3DAB-40E9-060C-A597-A23A6E5298A2}"/>
+              </a:ext>
+            </a:extLst>
+          </p:cNvPr>
+          <p:cNvSpPr/>
+          <p:nvPr/>
+        </p:nvSpPr>
+        <p:spPr>
+          <a:xfrm>
+            <a:off x="6791325" y="1549400"/>
+            <a:ext cx="841375" cy="390525"/>
+          </a:xfrm>
+          <a:prstGeom prst="rect">
+            <a:avLst/>
+          </a:prstGeom>
+          <a:solidFill>
+            <a:schemeClr val="accent1">
+              <a:lumMod val="40000"/>
+              <a:lumOff val="60000"/>
+            </a:schemeClr>
+          </a:solidFill>
+          <a:ln>
+            <a:solidFill>
+              <a:schemeClr val="tx1"/>
+            </a:solidFill>
+          </a:ln>
+        </p:spPr>
+        <p:style>
+          <a:lnRef idx="2">
+            <a:schemeClr val="accent1">
+              <a:shade val="15000"/>
+            </a:schemeClr>
+          </a:lnRef>
+          <a:fillRef idx="1">
+            <a:schemeClr val="accent1"/>
+          </a:fillRef>
+          <a:effectRef idx="0">
+            <a:schemeClr val="accent1"/>
+          </a:effectRef>
+          <a:fontRef idx="minor">
+            <a:schemeClr val="lt1"/>
+          </a:fontRef>
+        </p:style>
+        <p:txBody>
+          <a:bodyPr rtlCol="0" anchor="ctr"/>
+          <a:lstStyle/>
+          <a:p>
+            <a:pPr algn="ctr"/>
+            <a:r>
+              <a:rPr lang="de-DE" sz="1400" dirty="0" err="1">
+                <a:ln w="0"/>
+                <a:solidFill>
+                  <a:schemeClr val="tx1"/>
+                </a:solidFill>
+                <a:effectLst>
+                  <a:outerShdw blurRad="38100" dist="19050" dir="2700000" algn="tl" rotWithShape="0">
+                    <a:schemeClr val="dk1">
+                      <a:alpha val="40000"/>
+                    </a:schemeClr>
+                  </a:outerShdw>
+                </a:effectLst>
+              </a:rPr>
+              <a:t>azubis</a:t>
+            </a:r>
+            <a:endParaRPr lang="de-DE" sz="1400" dirty="0"/>
+          </a:p>
+        </p:txBody>
+      </p:sp>
+      <p:cxnSp>
+        <p:nvCxnSpPr>
+          <p:cNvPr id="44" name="Gerader Verbinder 43">
+            <a:extLst>
+              <a:ext uri="{FF2B5EF4-FFF2-40B4-BE49-F238E27FC236}">
+                <a16:creationId xmlns:a16="http://schemas.microsoft.com/office/drawing/2014/main" id="{84FA2290-A97F-41ED-04B2-7C7F496A87A8}"/>
+              </a:ext>
+            </a:extLst>
+          </p:cNvPr>
+          <p:cNvCxnSpPr>
+            <a:cxnSpLocks/>
+            <a:stCxn id="5" idx="1"/>
+            <a:endCxn id="4" idx="3"/>
+          </p:cNvCxnSpPr>
+          <p:nvPr/>
+        </p:nvCxnSpPr>
+        <p:spPr>
+          <a:xfrm flipH="1">
+            <a:off x="3219450" y="1744663"/>
+            <a:ext cx="830963" cy="0"/>
+          </a:xfrm>
+          <a:prstGeom prst="line">
+            <a:avLst/>
+          </a:prstGeom>
+          <a:ln w="19050">
+            <a:solidFill>
+              <a:schemeClr val="tx1"/>
+            </a:solidFill>
+          </a:ln>
+        </p:spPr>
+        <p:style>
+          <a:lnRef idx="1">
+            <a:schemeClr val="accent1"/>
+          </a:lnRef>
+          <a:fillRef idx="0">
+            <a:schemeClr val="accent1"/>
+          </a:fillRef>
+          <a:effectRef idx="0">
+            <a:schemeClr val="accent1"/>
+          </a:effectRef>
+          <a:fontRef idx="minor">
+            <a:schemeClr val="tx1"/>
+          </a:fontRef>
+        </p:style>
+      </p:cxnSp>
+      <p:cxnSp>
+        <p:nvCxnSpPr>
+          <p:cNvPr id="47" name="Gerader Verbinder 46">
+            <a:extLst>
+              <a:ext uri="{FF2B5EF4-FFF2-40B4-BE49-F238E27FC236}">
+                <a16:creationId xmlns:a16="http://schemas.microsoft.com/office/drawing/2014/main" id="{64559400-E3B0-5DC0-594A-996E84F6DAD5}"/>
+              </a:ext>
+            </a:extLst>
+          </p:cNvPr>
+          <p:cNvCxnSpPr>
+            <a:cxnSpLocks/>
+            <a:stCxn id="43" idx="1"/>
+            <a:endCxn id="5" idx="3"/>
+          </p:cNvCxnSpPr>
+          <p:nvPr/>
+        </p:nvCxnSpPr>
+        <p:spPr>
+          <a:xfrm flipH="1">
+            <a:off x="5815713" y="1744663"/>
+            <a:ext cx="975612" cy="0"/>
+          </a:xfrm>
+          <a:prstGeom prst="line">
+            <a:avLst/>
+          </a:prstGeom>
+          <a:ln w="19050">
+            <a:solidFill>
+              <a:schemeClr val="tx1"/>
+            </a:solidFill>
+          </a:ln>
+        </p:spPr>
+        <p:style>
+          <a:lnRef idx="1">
+            <a:schemeClr val="accent1"/>
+          </a:lnRef>
+          <a:fillRef idx="0">
+            <a:schemeClr val="accent1"/>
+          </a:fillRef>
+          <a:effectRef idx="0">
+            <a:schemeClr val="accent1"/>
+          </a:effectRef>
+          <a:fontRef idx="minor">
+            <a:schemeClr val="tx1"/>
+          </a:fontRef>
+        </p:style>
+      </p:cxnSp>
+      <p:sp>
+        <p:nvSpPr>
+          <p:cNvPr id="53" name="Ellipse 52">
+            <a:extLst>
+              <a:ext uri="{FF2B5EF4-FFF2-40B4-BE49-F238E27FC236}">
+                <a16:creationId xmlns:a16="http://schemas.microsoft.com/office/drawing/2014/main" id="{592FC410-3A64-0BFF-1DAF-15E609F05257}"/>
+              </a:ext>
+            </a:extLst>
+          </p:cNvPr>
+          <p:cNvSpPr/>
+          <p:nvPr/>
+        </p:nvSpPr>
+        <p:spPr>
+          <a:xfrm>
+            <a:off x="5579619" y="646072"/>
+            <a:ext cx="1447799" cy="390525"/>
+          </a:xfrm>
+          <a:prstGeom prst="ellipse">
+            <a:avLst/>
+          </a:prstGeom>
+          <a:solidFill>
+            <a:schemeClr val="accent4">
+              <a:lumMod val="40000"/>
+              <a:lumOff val="60000"/>
+            </a:schemeClr>
+          </a:solidFill>
+        </p:spPr>
+        <p:style>
+          <a:lnRef idx="2">
+            <a:schemeClr val="accent1">
+              <a:shade val="15000"/>
+            </a:schemeClr>
+          </a:lnRef>
+          <a:fillRef idx="1">
+            <a:schemeClr val="accent1"/>
+          </a:fillRef>
+          <a:effectRef idx="0">
+            <a:schemeClr val="accent1"/>
+          </a:effectRef>
+          <a:fontRef idx="minor">
+            <a:schemeClr val="lt1"/>
+          </a:fontRef>
+        </p:style>
+        <p:txBody>
+          <a:bodyPr rtlCol="0" anchor="ctr"/>
+          <a:lstStyle/>
+          <a:p>
+            <a:pPr algn="ctr"/>
+            <a:r>
+              <a:rPr lang="de-DE" sz="1400" u="sng" dirty="0" err="1">
+                <a:ln w="0"/>
+                <a:solidFill>
+                  <a:schemeClr val="tx1"/>
+                </a:solidFill>
+                <a:effectLst>
+                  <a:outerShdw blurRad="38100" dist="19050" dir="2700000" algn="tl" rotWithShape="0">
+                    <a:schemeClr val="dk1">
+                      <a:alpha val="40000"/>
+                    </a:schemeClr>
+                  </a:outerShdw>
+                </a:effectLst>
+              </a:rPr>
+              <a:t>azubiNR</a:t>
+            </a:r>
+            <a:endParaRPr lang="de-DE" sz="1400" u="sng" dirty="0">
+              <a:ln w="0"/>
+              <a:solidFill>
+                <a:schemeClr val="tx1"/>
+              </a:solidFill>
+              <a:effectLst>
+                <a:outerShdw blurRad="38100" dist="19050" dir="2700000" algn="tl" rotWithShape="0">
+                  <a:schemeClr val="dk1">
+                    <a:alpha val="40000"/>
+                  </a:schemeClr>
+                </a:outerShdw>
+              </a:effectLst>
+            </a:endParaRPr>
+          </a:p>
+        </p:txBody>
+      </p:sp>
+      <p:sp>
+        <p:nvSpPr>
+          <p:cNvPr id="54" name="Ellipse 53">
+            <a:extLst>
+              <a:ext uri="{FF2B5EF4-FFF2-40B4-BE49-F238E27FC236}">
+                <a16:creationId xmlns:a16="http://schemas.microsoft.com/office/drawing/2014/main" id="{43E65022-3079-C656-FADE-5FD859A7F58F}"/>
+              </a:ext>
+            </a:extLst>
+          </p:cNvPr>
+          <p:cNvSpPr/>
+          <p:nvPr/>
+        </p:nvSpPr>
+        <p:spPr>
+          <a:xfrm>
+            <a:off x="6791325" y="269876"/>
+            <a:ext cx="1384300" cy="390525"/>
+          </a:xfrm>
+          <a:prstGeom prst="ellipse">
+            <a:avLst/>
+          </a:prstGeom>
+          <a:solidFill>
+            <a:schemeClr val="accent4">
+              <a:lumMod val="40000"/>
+              <a:lumOff val="60000"/>
+            </a:schemeClr>
+          </a:solidFill>
+        </p:spPr>
+        <p:style>
+          <a:lnRef idx="2">
+            <a:schemeClr val="accent1">
+              <a:shade val="15000"/>
+            </a:schemeClr>
+          </a:lnRef>
+          <a:fillRef idx="1">
+            <a:schemeClr val="accent1"/>
+          </a:fillRef>
+          <a:effectRef idx="0">
+            <a:schemeClr val="accent1"/>
+          </a:effectRef>
+          <a:fontRef idx="minor">
+            <a:schemeClr val="lt1"/>
+          </a:fontRef>
+        </p:style>
+        <p:txBody>
+          <a:bodyPr rtlCol="0" anchor="ctr"/>
+          <a:lstStyle/>
+          <a:p>
+            <a:pPr algn="ctr"/>
+            <a:r>
+              <a:rPr lang="de-DE" sz="1400" dirty="0" err="1">
+                <a:ln w="0"/>
+                <a:solidFill>
+                  <a:schemeClr val="tx1"/>
+                </a:solidFill>
+                <a:effectLst>
+                  <a:outerShdw blurRad="38100" dist="19050" dir="2700000" algn="tl" rotWithShape="0">
+                    <a:schemeClr val="dk1">
+                      <a:alpha val="40000"/>
+                    </a:schemeClr>
+                  </a:outerShdw>
+                </a:effectLst>
+              </a:rPr>
+              <a:t>vorname</a:t>
+            </a:r>
+            <a:endParaRPr lang="de-DE" sz="1400" dirty="0">
+              <a:ln w="0"/>
+              <a:solidFill>
+                <a:schemeClr val="tx1"/>
+              </a:solidFill>
+              <a:effectLst>
+                <a:outerShdw blurRad="38100" dist="19050" dir="2700000" algn="tl" rotWithShape="0">
+                  <a:schemeClr val="dk1">
+                    <a:alpha val="40000"/>
+                  </a:schemeClr>
+                </a:outerShdw>
+              </a:effectLst>
+            </a:endParaRPr>
+          </a:p>
+        </p:txBody>
+      </p:sp>
+      <p:sp>
+        <p:nvSpPr>
+          <p:cNvPr id="55" name="Ellipse 54">
+            <a:extLst>
+              <a:ext uri="{FF2B5EF4-FFF2-40B4-BE49-F238E27FC236}">
+                <a16:creationId xmlns:a16="http://schemas.microsoft.com/office/drawing/2014/main" id="{48070636-8A11-0257-1F6C-7F47CF5612A4}"/>
+              </a:ext>
+            </a:extLst>
+          </p:cNvPr>
+          <p:cNvSpPr/>
+          <p:nvPr/>
+        </p:nvSpPr>
+        <p:spPr>
+          <a:xfrm>
+            <a:off x="7721600" y="714375"/>
+            <a:ext cx="1384300" cy="390525"/>
+          </a:xfrm>
+          <a:prstGeom prst="ellipse">
+            <a:avLst/>
+          </a:prstGeom>
+          <a:solidFill>
+            <a:schemeClr val="accent4">
+              <a:lumMod val="40000"/>
+              <a:lumOff val="60000"/>
+            </a:schemeClr>
+          </a:solidFill>
+        </p:spPr>
+        <p:style>
+          <a:lnRef idx="2">
+            <a:schemeClr val="accent1">
+              <a:shade val="15000"/>
+            </a:schemeClr>
+          </a:lnRef>
+          <a:fillRef idx="1">
+            <a:schemeClr val="accent1"/>
+          </a:fillRef>
+          <a:effectRef idx="0">
+            <a:schemeClr val="accent1"/>
+          </a:effectRef>
+          <a:fontRef idx="minor">
+            <a:schemeClr val="lt1"/>
+          </a:fontRef>
+        </p:style>
+        <p:txBody>
+          <a:bodyPr rtlCol="0" anchor="ctr"/>
+          <a:lstStyle/>
+          <a:p>
+            <a:pPr algn="ctr"/>
+            <a:r>
+              <a:rPr lang="de-DE" sz="1400" dirty="0" err="1">
+                <a:ln w="0"/>
+                <a:solidFill>
+                  <a:schemeClr val="tx1"/>
+                </a:solidFill>
+                <a:effectLst>
+                  <a:outerShdw blurRad="38100" dist="19050" dir="2700000" algn="tl" rotWithShape="0">
+                    <a:schemeClr val="dk1">
+                      <a:alpha val="40000"/>
+                    </a:schemeClr>
+                  </a:outerShdw>
+                </a:effectLst>
+              </a:rPr>
+              <a:t>nachname</a:t>
+            </a:r>
+            <a:endParaRPr lang="de-DE" sz="1400" dirty="0">
+              <a:ln w="0"/>
+              <a:solidFill>
+                <a:schemeClr val="tx1"/>
+              </a:solidFill>
+              <a:effectLst>
+                <a:outerShdw blurRad="38100" dist="19050" dir="2700000" algn="tl" rotWithShape="0">
+                  <a:schemeClr val="dk1">
+                    <a:alpha val="40000"/>
+                  </a:schemeClr>
+                </a:outerShdw>
+              </a:effectLst>
+            </a:endParaRPr>
+          </a:p>
+        </p:txBody>
+      </p:sp>
+      <p:sp>
+        <p:nvSpPr>
+          <p:cNvPr id="57" name="Ellipse 56">
+            <a:extLst>
+              <a:ext uri="{FF2B5EF4-FFF2-40B4-BE49-F238E27FC236}">
+                <a16:creationId xmlns:a16="http://schemas.microsoft.com/office/drawing/2014/main" id="{B9B7A791-5C95-F675-58D7-F4E7E5176977}"/>
+              </a:ext>
+            </a:extLst>
+          </p:cNvPr>
+          <p:cNvSpPr/>
+          <p:nvPr/>
+        </p:nvSpPr>
+        <p:spPr>
+          <a:xfrm>
+            <a:off x="8124824" y="1547972"/>
+            <a:ext cx="1913981" cy="390525"/>
+          </a:xfrm>
+          <a:prstGeom prst="ellipse">
+            <a:avLst/>
+          </a:prstGeom>
+          <a:solidFill>
+            <a:schemeClr val="accent4">
+              <a:lumMod val="40000"/>
+              <a:lumOff val="60000"/>
+            </a:schemeClr>
+          </a:solidFill>
+        </p:spPr>
+        <p:style>
+          <a:lnRef idx="2">
+            <a:schemeClr val="accent1">
+              <a:shade val="15000"/>
+            </a:schemeClr>
+          </a:lnRef>
+          <a:fillRef idx="1">
+            <a:schemeClr val="accent1"/>
+          </a:fillRef>
+          <a:effectRef idx="0">
+            <a:schemeClr val="accent1"/>
+          </a:effectRef>
+          <a:fontRef idx="minor">
+            <a:schemeClr val="lt1"/>
+          </a:fontRef>
+        </p:style>
+        <p:txBody>
+          <a:bodyPr rtlCol="0" anchor="ctr"/>
+          <a:lstStyle/>
+          <a:p>
+            <a:pPr algn="ctr"/>
+            <a:r>
+              <a:rPr lang="de-DE" sz="1400" dirty="0" err="1">
+                <a:ln w="0"/>
+                <a:solidFill>
+                  <a:schemeClr val="tx1"/>
+                </a:solidFill>
+                <a:effectLst>
+                  <a:outerShdw blurRad="38100" dist="19050" dir="2700000" algn="tl" rotWithShape="0">
+                    <a:schemeClr val="dk1">
+                      <a:alpha val="40000"/>
+                    </a:schemeClr>
+                  </a:outerShdw>
+                </a:effectLst>
+              </a:rPr>
+              <a:t>ausbildungsjahr</a:t>
+            </a:r>
+            <a:endParaRPr lang="de-DE" sz="1400" dirty="0">
+              <a:ln w="0"/>
+              <a:solidFill>
+                <a:schemeClr val="tx1"/>
+              </a:solidFill>
+              <a:effectLst>
+                <a:outerShdw blurRad="38100" dist="19050" dir="2700000" algn="tl" rotWithShape="0">
+                  <a:schemeClr val="dk1">
+                    <a:alpha val="40000"/>
+                  </a:schemeClr>
+                </a:outerShdw>
+              </a:effectLst>
+            </a:endParaRPr>
+          </a:p>
+        </p:txBody>
+      </p:sp>
+      <p:sp>
+        <p:nvSpPr>
+          <p:cNvPr id="58" name="Rechteck 57">
+            <a:extLst>
+              <a:ext uri="{FF2B5EF4-FFF2-40B4-BE49-F238E27FC236}">
+                <a16:creationId xmlns:a16="http://schemas.microsoft.com/office/drawing/2014/main" id="{D487A4CE-3B99-B08C-33B7-1C9D2E5EA6CE}"/>
+              </a:ext>
+            </a:extLst>
+          </p:cNvPr>
+          <p:cNvSpPr/>
+          <p:nvPr/>
+        </p:nvSpPr>
+        <p:spPr>
+          <a:xfrm>
+            <a:off x="6807200" y="4195761"/>
+            <a:ext cx="841375" cy="390525"/>
+          </a:xfrm>
+          <a:prstGeom prst="rect">
+            <a:avLst/>
+          </a:prstGeom>
+          <a:solidFill>
+            <a:schemeClr val="accent1">
+              <a:lumMod val="40000"/>
+              <a:lumOff val="60000"/>
+            </a:schemeClr>
+          </a:solidFill>
+          <a:ln>
+            <a:solidFill>
+              <a:schemeClr val="tx1"/>
+            </a:solidFill>
+          </a:ln>
+        </p:spPr>
+        <p:style>
+          <a:lnRef idx="2">
+            <a:schemeClr val="accent1">
+              <a:shade val="15000"/>
+            </a:schemeClr>
+          </a:lnRef>
+          <a:fillRef idx="1">
+            <a:schemeClr val="accent1"/>
+          </a:fillRef>
+          <a:effectRef idx="0">
+            <a:schemeClr val="accent1"/>
+          </a:effectRef>
+          <a:fontRef idx="minor">
+            <a:schemeClr val="lt1"/>
+          </a:fontRef>
+        </p:style>
+        <p:txBody>
+          <a:bodyPr rtlCol="0" anchor="ctr"/>
+          <a:lstStyle/>
+          <a:p>
+            <a:pPr algn="ctr"/>
+            <a:r>
+              <a:rPr lang="de-DE" sz="1400" dirty="0" err="1">
+                <a:ln w="0"/>
+                <a:solidFill>
+                  <a:schemeClr val="tx1"/>
+                </a:solidFill>
+                <a:effectLst>
+                  <a:outerShdw blurRad="38100" dist="19050" dir="2700000" algn="tl" rotWithShape="0">
+                    <a:schemeClr val="dk1">
+                      <a:alpha val="40000"/>
+                    </a:schemeClr>
+                  </a:outerShdw>
+                </a:effectLst>
+              </a:rPr>
+              <a:t>filialen</a:t>
+            </a:r>
+            <a:endParaRPr lang="de-DE" sz="1400" dirty="0"/>
+          </a:p>
+        </p:txBody>
+      </p:sp>
+      <p:sp>
+        <p:nvSpPr>
+          <p:cNvPr id="59" name="Ellipse 58">
+            <a:extLst>
+              <a:ext uri="{FF2B5EF4-FFF2-40B4-BE49-F238E27FC236}">
+                <a16:creationId xmlns:a16="http://schemas.microsoft.com/office/drawing/2014/main" id="{7CB506AB-EDE8-8114-E642-4C505554ADDE}"/>
+              </a:ext>
+            </a:extLst>
+          </p:cNvPr>
+          <p:cNvSpPr/>
+          <p:nvPr/>
+        </p:nvSpPr>
+        <p:spPr>
+          <a:xfrm>
+            <a:off x="6835775" y="4975265"/>
+            <a:ext cx="1295400" cy="390525"/>
+          </a:xfrm>
+          <a:prstGeom prst="ellipse">
+            <a:avLst/>
+          </a:prstGeom>
+          <a:solidFill>
+            <a:schemeClr val="accent4">
+              <a:lumMod val="40000"/>
+              <a:lumOff val="60000"/>
+            </a:schemeClr>
+          </a:solidFill>
+        </p:spPr>
+        <p:style>
+          <a:lnRef idx="2">
+            <a:schemeClr val="accent1">
+              <a:shade val="15000"/>
+            </a:schemeClr>
+          </a:lnRef>
+          <a:fillRef idx="1">
+            <a:schemeClr val="accent1"/>
+          </a:fillRef>
+          <a:effectRef idx="0">
+            <a:schemeClr val="accent1"/>
+          </a:effectRef>
+          <a:fontRef idx="minor">
+            <a:schemeClr val="lt1"/>
+          </a:fontRef>
+        </p:style>
+        <p:txBody>
+          <a:bodyPr rtlCol="0" anchor="ctr"/>
+          <a:lstStyle/>
+          <a:p>
+            <a:pPr algn="ctr"/>
+            <a:r>
+              <a:rPr lang="de-DE" sz="1400" dirty="0" err="1">
+                <a:ln w="0"/>
+                <a:solidFill>
+                  <a:schemeClr val="tx1"/>
+                </a:solidFill>
+                <a:effectLst>
+                  <a:outerShdw blurRad="38100" dist="19050" dir="2700000" algn="tl" rotWithShape="0">
+                    <a:schemeClr val="dk1">
+                      <a:alpha val="40000"/>
+                    </a:schemeClr>
+                  </a:outerShdw>
+                </a:effectLst>
+              </a:rPr>
+              <a:t>plz</a:t>
+            </a:r>
+            <a:endParaRPr lang="de-DE" sz="1400" dirty="0">
+              <a:ln w="0"/>
+              <a:solidFill>
+                <a:schemeClr val="tx1"/>
+              </a:solidFill>
+              <a:effectLst>
+                <a:outerShdw blurRad="38100" dist="19050" dir="2700000" algn="tl" rotWithShape="0">
+                  <a:schemeClr val="dk1">
+                    <a:alpha val="40000"/>
+                  </a:schemeClr>
+                </a:outerShdw>
+              </a:effectLst>
+            </a:endParaRPr>
+          </a:p>
+        </p:txBody>
+      </p:sp>
+      <p:sp>
+        <p:nvSpPr>
+          <p:cNvPr id="63" name="Ellipse 62">
+            <a:extLst>
+              <a:ext uri="{FF2B5EF4-FFF2-40B4-BE49-F238E27FC236}">
+                <a16:creationId xmlns:a16="http://schemas.microsoft.com/office/drawing/2014/main" id="{13F5BCFC-EA30-2637-4146-BACE62E9A46F}"/>
+              </a:ext>
+            </a:extLst>
+          </p:cNvPr>
+          <p:cNvSpPr/>
+          <p:nvPr/>
+        </p:nvSpPr>
+        <p:spPr>
+          <a:xfrm>
+            <a:off x="8175625" y="4246101"/>
+            <a:ext cx="1913981" cy="390525"/>
+          </a:xfrm>
+          <a:prstGeom prst="ellipse">
+            <a:avLst/>
+          </a:prstGeom>
+          <a:solidFill>
+            <a:schemeClr val="accent4">
+              <a:lumMod val="40000"/>
+              <a:lumOff val="60000"/>
+            </a:schemeClr>
+          </a:solidFill>
+        </p:spPr>
+        <p:style>
+          <a:lnRef idx="2">
+            <a:schemeClr val="accent1">
+              <a:shade val="15000"/>
+            </a:schemeClr>
+          </a:lnRef>
+          <a:fillRef idx="1">
+            <a:schemeClr val="accent1"/>
+          </a:fillRef>
+          <a:effectRef idx="0">
+            <a:schemeClr val="accent1"/>
+          </a:effectRef>
+          <a:fontRef idx="minor">
+            <a:schemeClr val="lt1"/>
+          </a:fontRef>
+        </p:style>
+        <p:txBody>
+          <a:bodyPr rtlCol="0" anchor="ctr"/>
+          <a:lstStyle/>
+          <a:p>
+            <a:pPr algn="ctr"/>
+            <a:r>
+              <a:rPr lang="de-DE" sz="1400" dirty="0" err="1">
+                <a:ln w="0"/>
+                <a:solidFill>
+                  <a:schemeClr val="tx1"/>
+                </a:solidFill>
+                <a:effectLst>
+                  <a:outerShdw blurRad="38100" dist="19050" dir="2700000" algn="tl" rotWithShape="0">
+                    <a:schemeClr val="dk1">
+                      <a:alpha val="40000"/>
+                    </a:schemeClr>
+                  </a:outerShdw>
+                </a:effectLst>
+              </a:rPr>
+              <a:t>strasse_hausnr</a:t>
+            </a:r>
+            <a:endParaRPr lang="de-DE" sz="1400" dirty="0">
+              <a:ln w="0"/>
+              <a:solidFill>
+                <a:schemeClr val="tx1"/>
+              </a:solidFill>
+              <a:effectLst>
+                <a:outerShdw blurRad="38100" dist="19050" dir="2700000" algn="tl" rotWithShape="0">
+                  <a:schemeClr val="dk1">
+                    <a:alpha val="40000"/>
+                  </a:schemeClr>
+                </a:outerShdw>
+              </a:effectLst>
+            </a:endParaRPr>
+          </a:p>
+        </p:txBody>
+      </p:sp>
+      <p:sp>
+        <p:nvSpPr>
+          <p:cNvPr id="66" name="Ellipse 65">
+            <a:extLst>
+              <a:ext uri="{FF2B5EF4-FFF2-40B4-BE49-F238E27FC236}">
+                <a16:creationId xmlns:a16="http://schemas.microsoft.com/office/drawing/2014/main" id="{7570E7DC-8A54-D707-021F-AA47609F32FE}"/>
+              </a:ext>
+            </a:extLst>
+          </p:cNvPr>
+          <p:cNvSpPr/>
+          <p:nvPr/>
+        </p:nvSpPr>
+        <p:spPr>
+          <a:xfrm>
+            <a:off x="4816032" y="4918074"/>
+            <a:ext cx="1333500" cy="390525"/>
+          </a:xfrm>
+          <a:prstGeom prst="ellipse">
+            <a:avLst/>
+          </a:prstGeom>
+          <a:solidFill>
+            <a:schemeClr val="accent4">
+              <a:lumMod val="40000"/>
+              <a:lumOff val="60000"/>
+            </a:schemeClr>
+          </a:solidFill>
+        </p:spPr>
+        <p:style>
+          <a:lnRef idx="2">
+            <a:schemeClr val="accent1">
+              <a:shade val="15000"/>
+            </a:schemeClr>
+          </a:lnRef>
+          <a:fillRef idx="1">
+            <a:schemeClr val="accent1"/>
+          </a:fillRef>
+          <a:effectRef idx="0">
+            <a:schemeClr val="accent1"/>
+          </a:effectRef>
+          <a:fontRef idx="minor">
+            <a:schemeClr val="lt1"/>
+          </a:fontRef>
+        </p:style>
+        <p:txBody>
+          <a:bodyPr rtlCol="0" anchor="ctr"/>
+          <a:lstStyle/>
+          <a:p>
+            <a:pPr algn="ctr"/>
+            <a:r>
+              <a:rPr lang="de-DE" sz="1400" dirty="0" err="1">
+                <a:ln w="0"/>
+                <a:solidFill>
+                  <a:schemeClr val="tx1"/>
+                </a:solidFill>
+                <a:effectLst>
+                  <a:outerShdw blurRad="38100" dist="19050" dir="2700000" algn="tl" rotWithShape="0">
+                    <a:schemeClr val="dk1">
+                      <a:alpha val="40000"/>
+                    </a:schemeClr>
+                  </a:outerShdw>
+                </a:effectLst>
+              </a:rPr>
+              <a:t>ort</a:t>
+            </a:r>
+            <a:endParaRPr lang="de-DE" sz="1400" dirty="0">
+              <a:ln w="0"/>
+              <a:solidFill>
+                <a:schemeClr val="tx1"/>
+              </a:solidFill>
+              <a:effectLst>
+                <a:outerShdw blurRad="38100" dist="19050" dir="2700000" algn="tl" rotWithShape="0">
+                  <a:schemeClr val="dk1">
+                    <a:alpha val="40000"/>
+                  </a:schemeClr>
+                </a:outerShdw>
+              </a:effectLst>
+            </a:endParaRPr>
+          </a:p>
+        </p:txBody>
+      </p:sp>
+      <p:cxnSp>
+        <p:nvCxnSpPr>
+          <p:cNvPr id="70" name="Gerader Verbinder 69">
+            <a:extLst>
+              <a:ext uri="{FF2B5EF4-FFF2-40B4-BE49-F238E27FC236}">
+                <a16:creationId xmlns:a16="http://schemas.microsoft.com/office/drawing/2014/main" id="{FF5F737D-C2FF-D57A-C7F5-A158121435EA}"/>
+              </a:ext>
+            </a:extLst>
+          </p:cNvPr>
+          <p:cNvCxnSpPr>
+            <a:cxnSpLocks/>
+            <a:stCxn id="58" idx="1"/>
+            <a:endCxn id="66" idx="7"/>
+          </p:cNvCxnSpPr>
+          <p:nvPr/>
+        </p:nvCxnSpPr>
+        <p:spPr>
+          <a:xfrm flipH="1">
+            <a:off x="5954245" y="4391024"/>
+            <a:ext cx="852955" cy="584241"/>
+          </a:xfrm>
+          <a:prstGeom prst="line">
+            <a:avLst/>
+          </a:prstGeom>
+          <a:ln w="19050">
+            <a:solidFill>
+              <a:schemeClr val="tx1"/>
+            </a:solidFill>
+          </a:ln>
+        </p:spPr>
+        <p:style>
+          <a:lnRef idx="1">
+            <a:schemeClr val="accent1"/>
+          </a:lnRef>
+          <a:fillRef idx="0">
+            <a:schemeClr val="accent1"/>
+          </a:fillRef>
+          <a:effectRef idx="0">
+            <a:schemeClr val="accent1"/>
+          </a:effectRef>
+          <a:fontRef idx="minor">
+            <a:schemeClr val="tx1"/>
+          </a:fontRef>
+        </p:style>
+      </p:cxnSp>
+      <p:cxnSp>
+        <p:nvCxnSpPr>
+          <p:cNvPr id="71" name="Gerader Verbinder 70">
+            <a:extLst>
+              <a:ext uri="{FF2B5EF4-FFF2-40B4-BE49-F238E27FC236}">
+                <a16:creationId xmlns:a16="http://schemas.microsoft.com/office/drawing/2014/main" id="{4183CE83-C10B-B863-CB5F-E7965D41FBA7}"/>
+              </a:ext>
+            </a:extLst>
+          </p:cNvPr>
+          <p:cNvCxnSpPr>
+            <a:cxnSpLocks/>
+            <a:stCxn id="58" idx="2"/>
+            <a:endCxn id="59" idx="0"/>
+          </p:cNvCxnSpPr>
+          <p:nvPr/>
+        </p:nvCxnSpPr>
+        <p:spPr>
+          <a:xfrm>
+            <a:off x="7227888" y="4586286"/>
+            <a:ext cx="255587" cy="388979"/>
+          </a:xfrm>
+          <a:prstGeom prst="line">
+            <a:avLst/>
+          </a:prstGeom>
+          <a:ln w="19050">
+            <a:solidFill>
+              <a:schemeClr val="tx1"/>
+            </a:solidFill>
+          </a:ln>
+        </p:spPr>
+        <p:style>
+          <a:lnRef idx="1">
+            <a:schemeClr val="accent1"/>
+          </a:lnRef>
+          <a:fillRef idx="0">
+            <a:schemeClr val="accent1"/>
+          </a:fillRef>
+          <a:effectRef idx="0">
+            <a:schemeClr val="accent1"/>
+          </a:effectRef>
+          <a:fontRef idx="minor">
+            <a:schemeClr val="tx1"/>
+          </a:fontRef>
+        </p:style>
+      </p:cxnSp>
+      <p:cxnSp>
+        <p:nvCxnSpPr>
+          <p:cNvPr id="72" name="Gerader Verbinder 71">
+            <a:extLst>
+              <a:ext uri="{FF2B5EF4-FFF2-40B4-BE49-F238E27FC236}">
+                <a16:creationId xmlns:a16="http://schemas.microsoft.com/office/drawing/2014/main" id="{95576CF0-A7E7-8638-CF84-4751AF153792}"/>
+              </a:ext>
+            </a:extLst>
+          </p:cNvPr>
+          <p:cNvCxnSpPr>
+            <a:cxnSpLocks/>
+            <a:stCxn id="58" idx="3"/>
+            <a:endCxn id="63" idx="2"/>
+          </p:cNvCxnSpPr>
+          <p:nvPr/>
+        </p:nvCxnSpPr>
+        <p:spPr>
+          <a:xfrm>
+            <a:off x="7648575" y="4391024"/>
+            <a:ext cx="527050" cy="50340"/>
+          </a:xfrm>
+          <a:prstGeom prst="line">
+            <a:avLst/>
+          </a:prstGeom>
+          <a:ln w="19050">
+            <a:solidFill>
+              <a:schemeClr val="tx1"/>
+            </a:solidFill>
+          </a:ln>
+        </p:spPr>
+        <p:style>
+          <a:lnRef idx="1">
+            <a:schemeClr val="accent1"/>
+          </a:lnRef>
+          <a:fillRef idx="0">
+            <a:schemeClr val="accent1"/>
+          </a:fillRef>
+          <a:effectRef idx="0">
+            <a:schemeClr val="accent1"/>
+          </a:effectRef>
+          <a:fontRef idx="minor">
+            <a:schemeClr val="tx1"/>
+          </a:fontRef>
+        </p:style>
+      </p:cxnSp>
+      <p:sp>
+        <p:nvSpPr>
+          <p:cNvPr id="97" name="Raute 96">
+            <a:extLst>
+              <a:ext uri="{FF2B5EF4-FFF2-40B4-BE49-F238E27FC236}">
+                <a16:creationId xmlns:a16="http://schemas.microsoft.com/office/drawing/2014/main" id="{0E6D7507-0E22-DACD-F110-6942ECBD7995}"/>
+              </a:ext>
+            </a:extLst>
+          </p:cNvPr>
+          <p:cNvSpPr/>
+          <p:nvPr/>
+        </p:nvSpPr>
+        <p:spPr>
+          <a:xfrm>
+            <a:off x="6149532" y="2907904"/>
+            <a:ext cx="2122137" cy="577850"/>
+          </a:xfrm>
+          <a:prstGeom prst="diamond">
+            <a:avLst/>
+          </a:prstGeom>
+          <a:solidFill>
+            <a:schemeClr val="accent6">
+              <a:lumMod val="40000"/>
+              <a:lumOff val="60000"/>
+            </a:schemeClr>
+          </a:solidFill>
+          <a:ln>
+            <a:solidFill>
+              <a:schemeClr val="tx1"/>
+            </a:solidFill>
+          </a:ln>
+        </p:spPr>
+        <p:style>
+          <a:lnRef idx="2">
+            <a:schemeClr val="accent1">
+              <a:shade val="15000"/>
+            </a:schemeClr>
+          </a:lnRef>
+          <a:fillRef idx="1">
+            <a:schemeClr val="accent1"/>
+          </a:fillRef>
+          <a:effectRef idx="0">
+            <a:schemeClr val="accent1"/>
+          </a:effectRef>
+          <a:fontRef idx="minor">
+            <a:schemeClr val="lt1"/>
+          </a:fontRef>
+        </p:style>
+        <p:txBody>
+          <a:bodyPr rtlCol="0" anchor="ctr"/>
+          <a:lstStyle/>
+          <a:p>
+            <a:pPr algn="ctr"/>
+            <a:r>
+              <a:rPr lang="de-DE" sz="1400" dirty="0">
+                <a:ln w="0"/>
+                <a:solidFill>
+                  <a:schemeClr val="tx1"/>
+                </a:solidFill>
+                <a:effectLst>
+                  <a:outerShdw blurRad="38100" dist="19050" dir="2700000" algn="tl" rotWithShape="0">
+                    <a:schemeClr val="dk1">
+                      <a:alpha val="40000"/>
+                    </a:schemeClr>
+                  </a:outerShdw>
+                </a:effectLst>
+              </a:rPr>
+              <a:t>tätig</a:t>
+            </a:r>
+          </a:p>
+        </p:txBody>
+      </p:sp>
+      <p:cxnSp>
+        <p:nvCxnSpPr>
+          <p:cNvPr id="98" name="Gerader Verbinder 97">
+            <a:extLst>
+              <a:ext uri="{FF2B5EF4-FFF2-40B4-BE49-F238E27FC236}">
+                <a16:creationId xmlns:a16="http://schemas.microsoft.com/office/drawing/2014/main" id="{374EF93E-ABA6-8126-042B-435896793DC8}"/>
+              </a:ext>
+            </a:extLst>
+          </p:cNvPr>
+          <p:cNvCxnSpPr>
+            <a:cxnSpLocks/>
+            <a:stCxn id="43" idx="0"/>
+            <a:endCxn id="53" idx="5"/>
+          </p:cNvCxnSpPr>
+          <p:nvPr/>
+        </p:nvCxnSpPr>
+        <p:spPr>
+          <a:xfrm flipH="1" flipV="1">
+            <a:off x="6815393" y="979406"/>
+            <a:ext cx="396620" cy="569994"/>
+          </a:xfrm>
+          <a:prstGeom prst="line">
+            <a:avLst/>
+          </a:prstGeom>
+          <a:ln w="19050">
+            <a:solidFill>
+              <a:schemeClr val="tx1"/>
+            </a:solidFill>
+          </a:ln>
+        </p:spPr>
+        <p:style>
+          <a:lnRef idx="1">
+            <a:schemeClr val="accent1"/>
+          </a:lnRef>
+          <a:fillRef idx="0">
+            <a:schemeClr val="accent1"/>
+          </a:fillRef>
+          <a:effectRef idx="0">
+            <a:schemeClr val="accent1"/>
+          </a:effectRef>
+          <a:fontRef idx="minor">
+            <a:schemeClr val="tx1"/>
+          </a:fontRef>
+        </p:style>
+      </p:cxnSp>
+      <p:cxnSp>
+        <p:nvCxnSpPr>
+          <p:cNvPr id="101" name="Gerader Verbinder 100">
+            <a:extLst>
+              <a:ext uri="{FF2B5EF4-FFF2-40B4-BE49-F238E27FC236}">
+                <a16:creationId xmlns:a16="http://schemas.microsoft.com/office/drawing/2014/main" id="{E2F5D480-7AF0-6A18-6FC3-05366D398397}"/>
+              </a:ext>
+            </a:extLst>
+          </p:cNvPr>
+          <p:cNvCxnSpPr>
+            <a:cxnSpLocks/>
+            <a:stCxn id="43" idx="0"/>
+            <a:endCxn id="54" idx="4"/>
+          </p:cNvCxnSpPr>
+          <p:nvPr/>
+        </p:nvCxnSpPr>
+        <p:spPr>
+          <a:xfrm flipV="1">
+            <a:off x="7212013" y="660401"/>
+            <a:ext cx="271462" cy="888999"/>
+          </a:xfrm>
+          <a:prstGeom prst="line">
+            <a:avLst/>
+          </a:prstGeom>
+          <a:ln w="19050">
+            <a:solidFill>
+              <a:schemeClr val="tx1"/>
+            </a:solidFill>
+          </a:ln>
+        </p:spPr>
+        <p:style>
+          <a:lnRef idx="1">
+            <a:schemeClr val="accent1"/>
+          </a:lnRef>
+          <a:fillRef idx="0">
+            <a:schemeClr val="accent1"/>
+          </a:fillRef>
+          <a:effectRef idx="0">
+            <a:schemeClr val="accent1"/>
+          </a:effectRef>
+          <a:fontRef idx="minor">
+            <a:schemeClr val="tx1"/>
+          </a:fontRef>
+        </p:style>
+      </p:cxnSp>
+      <p:cxnSp>
+        <p:nvCxnSpPr>
+          <p:cNvPr id="104" name="Gerader Verbinder 103">
+            <a:extLst>
+              <a:ext uri="{FF2B5EF4-FFF2-40B4-BE49-F238E27FC236}">
+                <a16:creationId xmlns:a16="http://schemas.microsoft.com/office/drawing/2014/main" id="{B43EA03E-C74E-ADAE-8C27-4591A5F57242}"/>
+              </a:ext>
+            </a:extLst>
+          </p:cNvPr>
+          <p:cNvCxnSpPr>
+            <a:cxnSpLocks/>
+            <a:stCxn id="43" idx="0"/>
+            <a:endCxn id="55" idx="3"/>
+          </p:cNvCxnSpPr>
+          <p:nvPr/>
+        </p:nvCxnSpPr>
+        <p:spPr>
+          <a:xfrm flipV="1">
+            <a:off x="7212013" y="1047709"/>
+            <a:ext cx="712313" cy="501691"/>
+          </a:xfrm>
+          <a:prstGeom prst="line">
+            <a:avLst/>
+          </a:prstGeom>
+          <a:ln w="19050">
+            <a:solidFill>
+              <a:schemeClr val="tx1"/>
+            </a:solidFill>
+          </a:ln>
+        </p:spPr>
+        <p:style>
+          <a:lnRef idx="1">
+            <a:schemeClr val="accent1"/>
+          </a:lnRef>
+          <a:fillRef idx="0">
+            <a:schemeClr val="accent1"/>
+          </a:fillRef>
+          <a:effectRef idx="0">
+            <a:schemeClr val="accent1"/>
+          </a:effectRef>
+          <a:fontRef idx="minor">
+            <a:schemeClr val="tx1"/>
+          </a:fontRef>
+        </p:style>
+      </p:cxnSp>
+      <p:cxnSp>
+        <p:nvCxnSpPr>
+          <p:cNvPr id="107" name="Gerader Verbinder 106">
+            <a:extLst>
+              <a:ext uri="{FF2B5EF4-FFF2-40B4-BE49-F238E27FC236}">
+                <a16:creationId xmlns:a16="http://schemas.microsoft.com/office/drawing/2014/main" id="{AAFF8750-5AC5-C4BA-DB11-2D65C9E3E379}"/>
+              </a:ext>
+            </a:extLst>
+          </p:cNvPr>
+          <p:cNvCxnSpPr>
+            <a:cxnSpLocks/>
+            <a:stCxn id="57" idx="2"/>
+            <a:endCxn id="43" idx="3"/>
+          </p:cNvCxnSpPr>
+          <p:nvPr/>
+        </p:nvCxnSpPr>
+        <p:spPr>
+          <a:xfrm flipH="1">
+            <a:off x="7632700" y="1743235"/>
+            <a:ext cx="492124" cy="1428"/>
+          </a:xfrm>
+          <a:prstGeom prst="line">
+            <a:avLst/>
+          </a:prstGeom>
+          <a:ln w="19050">
+            <a:solidFill>
+              <a:schemeClr val="tx1"/>
+            </a:solidFill>
+          </a:ln>
+        </p:spPr>
+        <p:style>
+          <a:lnRef idx="1">
+            <a:schemeClr val="accent1"/>
+          </a:lnRef>
+          <a:fillRef idx="0">
+            <a:schemeClr val="accent1"/>
+          </a:fillRef>
+          <a:effectRef idx="0">
+            <a:schemeClr val="accent1"/>
+          </a:effectRef>
+          <a:fontRef idx="minor">
+            <a:schemeClr val="tx1"/>
+          </a:fontRef>
+        </p:style>
+      </p:cxnSp>
+      <p:cxnSp>
+        <p:nvCxnSpPr>
+          <p:cNvPr id="110" name="Gerader Verbinder 109">
+            <a:extLst>
+              <a:ext uri="{FF2B5EF4-FFF2-40B4-BE49-F238E27FC236}">
+                <a16:creationId xmlns:a16="http://schemas.microsoft.com/office/drawing/2014/main" id="{B8627B9D-8DFC-3AE5-5BD4-0F5D3D1F5F41}"/>
+              </a:ext>
+            </a:extLst>
+          </p:cNvPr>
+          <p:cNvCxnSpPr>
+            <a:cxnSpLocks/>
+            <a:stCxn id="43" idx="2"/>
+            <a:endCxn id="97" idx="0"/>
+          </p:cNvCxnSpPr>
+          <p:nvPr/>
+        </p:nvCxnSpPr>
+        <p:spPr>
+          <a:xfrm flipH="1">
+            <a:off x="7210601" y="1939925"/>
+            <a:ext cx="1412" cy="967979"/>
+          </a:xfrm>
+          <a:prstGeom prst="line">
+            <a:avLst/>
+          </a:prstGeom>
+          <a:ln w="19050">
+            <a:solidFill>
+              <a:schemeClr val="tx1"/>
+            </a:solidFill>
+          </a:ln>
+        </p:spPr>
+        <p:style>
+          <a:lnRef idx="1">
+            <a:schemeClr val="accent1"/>
+          </a:lnRef>
+          <a:fillRef idx="0">
+            <a:schemeClr val="accent1"/>
+          </a:fillRef>
+          <a:effectRef idx="0">
+            <a:schemeClr val="accent1"/>
+          </a:effectRef>
+          <a:fontRef idx="minor">
+            <a:schemeClr val="tx1"/>
+          </a:fontRef>
+        </p:style>
+      </p:cxnSp>
+      <p:cxnSp>
+        <p:nvCxnSpPr>
+          <p:cNvPr id="114" name="Gerader Verbinder 113">
+            <a:extLst>
+              <a:ext uri="{FF2B5EF4-FFF2-40B4-BE49-F238E27FC236}">
+                <a16:creationId xmlns:a16="http://schemas.microsoft.com/office/drawing/2014/main" id="{5160D51E-0743-7388-FDB1-9A64D2788FAF}"/>
+              </a:ext>
+            </a:extLst>
+          </p:cNvPr>
+          <p:cNvCxnSpPr>
+            <a:cxnSpLocks/>
+            <a:stCxn id="58" idx="0"/>
+            <a:endCxn id="97" idx="2"/>
+          </p:cNvCxnSpPr>
+          <p:nvPr/>
+        </p:nvCxnSpPr>
+        <p:spPr>
+          <a:xfrm flipH="1" flipV="1">
+            <a:off x="7210601" y="3485754"/>
+            <a:ext cx="17287" cy="710007"/>
+          </a:xfrm>
+          <a:prstGeom prst="line">
+            <a:avLst/>
+          </a:prstGeom>
+          <a:ln w="19050">
+            <a:solidFill>
+              <a:schemeClr val="tx1"/>
+            </a:solidFill>
+          </a:ln>
+        </p:spPr>
+        <p:style>
+          <a:lnRef idx="1">
+            <a:schemeClr val="accent1"/>
+          </a:lnRef>
+          <a:fillRef idx="0">
+            <a:schemeClr val="accent1"/>
+          </a:fillRef>
+          <a:effectRef idx="0">
+            <a:schemeClr val="accent1"/>
+          </a:effectRef>
+          <a:fontRef idx="minor">
+            <a:schemeClr val="tx1"/>
+          </a:fontRef>
+        </p:style>
+      </p:cxnSp>
+      <p:sp>
+        <p:nvSpPr>
+          <p:cNvPr id="117" name="Textfeld 116">
+            <a:extLst>
+              <a:ext uri="{FF2B5EF4-FFF2-40B4-BE49-F238E27FC236}">
+                <a16:creationId xmlns:a16="http://schemas.microsoft.com/office/drawing/2014/main" id="{F89EC467-852E-038D-8AAA-BB9D210C9248}"/>
+              </a:ext>
+            </a:extLst>
+          </p:cNvPr>
+          <p:cNvSpPr txBox="1"/>
+          <p:nvPr/>
+        </p:nvSpPr>
+        <p:spPr>
+          <a:xfrm>
+            <a:off x="3419618" y="1422956"/>
+            <a:ext cx="247507" cy="369332"/>
+          </a:xfrm>
+          <a:prstGeom prst="rect">
+            <a:avLst/>
+          </a:prstGeom>
+          <a:noFill/>
+        </p:spPr>
+        <p:txBody>
+          <a:bodyPr wrap="square" rtlCol="0">
+            <a:spAutoFit/>
+          </a:bodyPr>
+          <a:lstStyle/>
+          <a:p>
+            <a:r>
+              <a:rPr lang="de-DE" dirty="0"/>
+              <a:t>1</a:t>
+            </a:r>
+          </a:p>
+        </p:txBody>
+      </p:sp>
+      <p:sp>
+        <p:nvSpPr>
+          <p:cNvPr id="118" name="Textfeld 117">
+            <a:extLst>
+              <a:ext uri="{FF2B5EF4-FFF2-40B4-BE49-F238E27FC236}">
+                <a16:creationId xmlns:a16="http://schemas.microsoft.com/office/drawing/2014/main" id="{82F7298C-1312-4103-9801-4796197483B0}"/>
+              </a:ext>
+            </a:extLst>
+          </p:cNvPr>
+          <p:cNvSpPr txBox="1"/>
+          <p:nvPr/>
+        </p:nvSpPr>
+        <p:spPr>
+          <a:xfrm>
+            <a:off x="6129593" y="1455738"/>
+            <a:ext cx="247507" cy="369332"/>
+          </a:xfrm>
+          <a:prstGeom prst="rect">
+            <a:avLst/>
+          </a:prstGeom>
+          <a:noFill/>
+        </p:spPr>
+        <p:txBody>
+          <a:bodyPr wrap="square" rtlCol="0">
+            <a:spAutoFit/>
+          </a:bodyPr>
+          <a:lstStyle/>
+          <a:p>
+            <a:r>
+              <a:rPr lang="de-DE" dirty="0"/>
+              <a:t>N</a:t>
+            </a:r>
+          </a:p>
+        </p:txBody>
+      </p:sp>
+      <p:sp>
+        <p:nvSpPr>
+          <p:cNvPr id="119" name="Textfeld 118">
+            <a:extLst>
+              <a:ext uri="{FF2B5EF4-FFF2-40B4-BE49-F238E27FC236}">
+                <a16:creationId xmlns:a16="http://schemas.microsoft.com/office/drawing/2014/main" id="{47999D74-5005-A028-3396-D603DC9515F8}"/>
+              </a:ext>
+            </a:extLst>
+          </p:cNvPr>
+          <p:cNvSpPr txBox="1"/>
+          <p:nvPr/>
+        </p:nvSpPr>
+        <p:spPr>
+          <a:xfrm>
+            <a:off x="7210600" y="3620570"/>
+            <a:ext cx="247507" cy="369332"/>
+          </a:xfrm>
+          <a:prstGeom prst="rect">
+            <a:avLst/>
+          </a:prstGeom>
+          <a:noFill/>
+        </p:spPr>
+        <p:txBody>
+          <a:bodyPr wrap="square" rtlCol="0">
+            <a:spAutoFit/>
+          </a:bodyPr>
+          <a:lstStyle/>
+          <a:p>
+            <a:r>
+              <a:rPr lang="de-DE" dirty="0"/>
+              <a:t>M</a:t>
+            </a:r>
+          </a:p>
+        </p:txBody>
+      </p:sp>
+      <p:sp>
+        <p:nvSpPr>
+          <p:cNvPr id="120" name="Textfeld 119">
+            <a:extLst>
+              <a:ext uri="{FF2B5EF4-FFF2-40B4-BE49-F238E27FC236}">
+                <a16:creationId xmlns:a16="http://schemas.microsoft.com/office/drawing/2014/main" id="{B4631597-6740-9683-E564-441E2ECB6491}"/>
+              </a:ext>
+            </a:extLst>
+          </p:cNvPr>
+          <p:cNvSpPr txBox="1"/>
+          <p:nvPr/>
+        </p:nvSpPr>
+        <p:spPr>
+          <a:xfrm>
+            <a:off x="7167283" y="2256275"/>
+            <a:ext cx="247507" cy="369332"/>
+          </a:xfrm>
+          <a:prstGeom prst="rect">
+            <a:avLst/>
+          </a:prstGeom>
+          <a:noFill/>
+        </p:spPr>
+        <p:txBody>
+          <a:bodyPr wrap="square" rtlCol="0">
+            <a:spAutoFit/>
+          </a:bodyPr>
+          <a:lstStyle/>
+          <a:p>
+            <a:r>
+              <a:rPr lang="de-DE" dirty="0"/>
+              <a:t>N</a:t>
+            </a:r>
+          </a:p>
+        </p:txBody>
+      </p:sp>
+      <p:sp>
+        <p:nvSpPr>
+          <p:cNvPr id="129" name="Ellipse 128">
+            <a:extLst>
+              <a:ext uri="{FF2B5EF4-FFF2-40B4-BE49-F238E27FC236}">
+                <a16:creationId xmlns:a16="http://schemas.microsoft.com/office/drawing/2014/main" id="{CC914E5B-2D1C-A917-9A29-C5A45B91FC05}"/>
+              </a:ext>
+            </a:extLst>
+          </p:cNvPr>
+          <p:cNvSpPr/>
+          <p:nvPr/>
+        </p:nvSpPr>
+        <p:spPr>
+          <a:xfrm>
+            <a:off x="4581178" y="4142300"/>
+            <a:ext cx="1447799" cy="390525"/>
+          </a:xfrm>
+          <a:prstGeom prst="ellipse">
+            <a:avLst/>
+          </a:prstGeom>
+          <a:solidFill>
+            <a:schemeClr val="accent4">
+              <a:lumMod val="40000"/>
+              <a:lumOff val="60000"/>
+            </a:schemeClr>
+          </a:solidFill>
+        </p:spPr>
+        <p:style>
+          <a:lnRef idx="2">
+            <a:schemeClr val="accent1">
+              <a:shade val="15000"/>
+            </a:schemeClr>
+          </a:lnRef>
+          <a:fillRef idx="1">
+            <a:schemeClr val="accent1"/>
+          </a:fillRef>
+          <a:effectRef idx="0">
+            <a:schemeClr val="accent1"/>
+          </a:effectRef>
+          <a:fontRef idx="minor">
+            <a:schemeClr val="lt1"/>
+          </a:fontRef>
+        </p:style>
+        <p:txBody>
+          <a:bodyPr rtlCol="0" anchor="ctr"/>
+          <a:lstStyle/>
+          <a:p>
+            <a:pPr algn="ctr"/>
+            <a:r>
+              <a:rPr lang="de-DE" sz="1400" u="sng" dirty="0" err="1">
+                <a:ln w="0"/>
+                <a:solidFill>
+                  <a:schemeClr val="tx1"/>
+                </a:solidFill>
+                <a:effectLst>
+                  <a:outerShdw blurRad="38100" dist="19050" dir="2700000" algn="tl" rotWithShape="0">
+                    <a:schemeClr val="dk1">
+                      <a:alpha val="40000"/>
+                    </a:schemeClr>
+                  </a:outerShdw>
+                </a:effectLst>
+              </a:rPr>
+              <a:t>filialNR</a:t>
+            </a:r>
+            <a:endParaRPr lang="de-DE" sz="1400" u="sng" dirty="0">
+              <a:ln w="0"/>
+              <a:solidFill>
+                <a:schemeClr val="tx1"/>
+              </a:solidFill>
+              <a:effectLst>
+                <a:outerShdw blurRad="38100" dist="19050" dir="2700000" algn="tl" rotWithShape="0">
+                  <a:schemeClr val="dk1">
+                    <a:alpha val="40000"/>
+                  </a:schemeClr>
+                </a:outerShdw>
+              </a:effectLst>
+            </a:endParaRPr>
+          </a:p>
+        </p:txBody>
+      </p:sp>
+      <p:cxnSp>
+        <p:nvCxnSpPr>
+          <p:cNvPr id="130" name="Gerader Verbinder 129">
+            <a:extLst>
+              <a:ext uri="{FF2B5EF4-FFF2-40B4-BE49-F238E27FC236}">
+                <a16:creationId xmlns:a16="http://schemas.microsoft.com/office/drawing/2014/main" id="{E42E6D7E-E73D-FF40-9631-4AB49E48647A}"/>
+              </a:ext>
+            </a:extLst>
+          </p:cNvPr>
+          <p:cNvCxnSpPr>
+            <a:cxnSpLocks/>
+            <a:stCxn id="58" idx="1"/>
+            <a:endCxn id="129" idx="6"/>
+          </p:cNvCxnSpPr>
+          <p:nvPr/>
+        </p:nvCxnSpPr>
+        <p:spPr>
+          <a:xfrm flipH="1" flipV="1">
+            <a:off x="6028977" y="4337563"/>
+            <a:ext cx="778223" cy="53461"/>
+          </a:xfrm>
+          <a:prstGeom prst="line">
+            <a:avLst/>
+          </a:prstGeom>
+          <a:ln w="19050">
+            <a:solidFill>
+              <a:schemeClr val="tx1"/>
+            </a:solidFill>
+          </a:ln>
+        </p:spPr>
+        <p:style>
+          <a:lnRef idx="1">
+            <a:schemeClr val="accent1"/>
+          </a:lnRef>
+          <a:fillRef idx="0">
+            <a:schemeClr val="accent1"/>
+          </a:fillRef>
+          <a:effectRef idx="0">
+            <a:schemeClr val="accent1"/>
+          </a:effectRef>
+          <a:fontRef idx="minor">
+            <a:schemeClr val="tx1"/>
+          </a:fontRef>
+        </p:style>
+      </p:cxnSp>
+    </p:spTree>
+    <p:extLst>
+      <p:ext uri="{BB962C8B-B14F-4D97-AF65-F5344CB8AC3E}">
+        <p14:creationId xmlns:p14="http://schemas.microsoft.com/office/powerpoint/2010/main" val="2825963552"/>
       </p:ext>
     </p:extLst>
   </p:cSld>

</xml_diff>